<commit_message>
Finished the user manual
</commit_message>
<xml_diff>
--- a/Not_Main_Application/UserManual.pptx
+++ b/Not_Main_Application/UserManual.pptx
@@ -5,7 +5,7 @@
     <p:sldMasterId id="2147483660" r:id="rId1"/>
   </p:sldMasterIdLst>
   <p:notesMasterIdLst>
-    <p:notesMasterId r:id="rId36"/>
+    <p:notesMasterId r:id="rId39"/>
   </p:notesMasterIdLst>
   <p:sldIdLst>
     <p:sldId id="256" r:id="rId2"/>
@@ -42,6 +42,9 @@
     <p:sldId id="287" r:id="rId33"/>
     <p:sldId id="288" r:id="rId34"/>
     <p:sldId id="289" r:id="rId35"/>
+    <p:sldId id="290" r:id="rId36"/>
+    <p:sldId id="291" r:id="rId37"/>
+    <p:sldId id="292" r:id="rId38"/>
   </p:sldIdLst>
   <p:sldSz cx="9144000" cy="6858000" type="screen4x3"/>
   <p:notesSz cx="6858000" cy="9144000"/>
@@ -140,6 +143,11 @@
       </a:defRPr>
     </a:lvl9pPr>
   </p:defaultTextStyle>
+  <p:extLst>
+    <p:ext uri="{EFAFB233-063F-42B5-8137-9DF3F51BA10A}">
+      <p15:sldGuideLst xmlns:p15="http://schemas.microsoft.com/office/powerpoint/2012/main"/>
+    </p:ext>
+  </p:extLst>
 </p:presentation>
 </file>
 
@@ -225,7 +233,7 @@
           <a:p>
             <a:fld id="{C128E5F2-3E43-A348-95A4-0CE0A417E92A}" type="datetimeFigureOut">
               <a:rPr lang="en-US" smtClean="0"/>
-              <a:t>4/16/19</a:t>
+              <a:t>4/17/19</a:t>
             </a:fld>
             <a:endParaRPr lang="en-US"/>
           </a:p>
@@ -707,7 +715,7 @@
           <a:p>
             <a:fld id="{79CC520B-3C03-A146-A34E-02F1D56BE37F}" type="datetimeFigureOut">
               <a:rPr lang="en-US" smtClean="0"/>
-              <a:t>4/16/19</a:t>
+              <a:t>4/17/19</a:t>
             </a:fld>
             <a:endParaRPr lang="en-US"/>
           </a:p>
@@ -877,7 +885,7 @@
           <a:p>
             <a:fld id="{79CC520B-3C03-A146-A34E-02F1D56BE37F}" type="datetimeFigureOut">
               <a:rPr lang="en-US" smtClean="0"/>
-              <a:t>4/16/19</a:t>
+              <a:t>4/17/19</a:t>
             </a:fld>
             <a:endParaRPr lang="en-US"/>
           </a:p>
@@ -1057,7 +1065,7 @@
           <a:p>
             <a:fld id="{79CC520B-3C03-A146-A34E-02F1D56BE37F}" type="datetimeFigureOut">
               <a:rPr lang="en-US" smtClean="0"/>
-              <a:t>4/16/19</a:t>
+              <a:t>4/17/19</a:t>
             </a:fld>
             <a:endParaRPr lang="en-US"/>
           </a:p>
@@ -1227,7 +1235,7 @@
           <a:p>
             <a:fld id="{79CC520B-3C03-A146-A34E-02F1D56BE37F}" type="datetimeFigureOut">
               <a:rPr lang="en-US" smtClean="0"/>
-              <a:t>4/16/19</a:t>
+              <a:t>4/17/19</a:t>
             </a:fld>
             <a:endParaRPr lang="en-US"/>
           </a:p>
@@ -1471,7 +1479,7 @@
           <a:p>
             <a:fld id="{79CC520B-3C03-A146-A34E-02F1D56BE37F}" type="datetimeFigureOut">
               <a:rPr lang="en-US" smtClean="0"/>
-              <a:t>4/16/19</a:t>
+              <a:t>4/17/19</a:t>
             </a:fld>
             <a:endParaRPr lang="en-US"/>
           </a:p>
@@ -1703,7 +1711,7 @@
           <a:p>
             <a:fld id="{79CC520B-3C03-A146-A34E-02F1D56BE37F}" type="datetimeFigureOut">
               <a:rPr lang="en-US" smtClean="0"/>
-              <a:t>4/16/19</a:t>
+              <a:t>4/17/19</a:t>
             </a:fld>
             <a:endParaRPr lang="en-US"/>
           </a:p>
@@ -2070,7 +2078,7 @@
           <a:p>
             <a:fld id="{79CC520B-3C03-A146-A34E-02F1D56BE37F}" type="datetimeFigureOut">
               <a:rPr lang="en-US" smtClean="0"/>
-              <a:t>4/16/19</a:t>
+              <a:t>4/17/19</a:t>
             </a:fld>
             <a:endParaRPr lang="en-US"/>
           </a:p>
@@ -2188,7 +2196,7 @@
           <a:p>
             <a:fld id="{79CC520B-3C03-A146-A34E-02F1D56BE37F}" type="datetimeFigureOut">
               <a:rPr lang="en-US" smtClean="0"/>
-              <a:t>4/16/19</a:t>
+              <a:t>4/17/19</a:t>
             </a:fld>
             <a:endParaRPr lang="en-US"/>
           </a:p>
@@ -2283,7 +2291,7 @@
           <a:p>
             <a:fld id="{79CC520B-3C03-A146-A34E-02F1D56BE37F}" type="datetimeFigureOut">
               <a:rPr lang="en-US" smtClean="0"/>
-              <a:t>4/16/19</a:t>
+              <a:t>4/17/19</a:t>
             </a:fld>
             <a:endParaRPr lang="en-US"/>
           </a:p>
@@ -2560,7 +2568,7 @@
           <a:p>
             <a:fld id="{79CC520B-3C03-A146-A34E-02F1D56BE37F}" type="datetimeFigureOut">
               <a:rPr lang="en-US" smtClean="0"/>
-              <a:t>4/16/19</a:t>
+              <a:t>4/17/19</a:t>
             </a:fld>
             <a:endParaRPr lang="en-US"/>
           </a:p>
@@ -2817,7 +2825,7 @@
           <a:p>
             <a:fld id="{79CC520B-3C03-A146-A34E-02F1D56BE37F}" type="datetimeFigureOut">
               <a:rPr lang="en-US" smtClean="0"/>
-              <a:t>4/16/19</a:t>
+              <a:t>4/17/19</a:t>
             </a:fld>
             <a:endParaRPr lang="en-US"/>
           </a:p>
@@ -3033,7 +3041,7 @@
           <a:p>
             <a:fld id="{79CC520B-3C03-A146-A34E-02F1D56BE37F}" type="datetimeFigureOut">
               <a:rPr lang="en-US" smtClean="0"/>
-              <a:t>4/16/19</a:t>
+              <a:t>4/17/19</a:t>
             </a:fld>
             <a:endParaRPr lang="en-US"/>
           </a:p>
@@ -3704,6 +3712,46 @@
           </a:fontRef>
         </p:style>
       </p:cxnSp>
+      <p:sp>
+        <p:nvSpPr>
+          <p:cNvPr id="7" name="TextBox 6">
+            <a:extLst>
+              <a:ext uri="{FF2B5EF4-FFF2-40B4-BE49-F238E27FC236}">
+                <a16:creationId xmlns:a16="http://schemas.microsoft.com/office/drawing/2014/main" id="{189A6BB3-8801-6F4D-BDC7-4E968D708549}"/>
+              </a:ext>
+            </a:extLst>
+          </p:cNvPr>
+          <p:cNvSpPr txBox="1"/>
+          <p:nvPr/>
+        </p:nvSpPr>
+        <p:spPr>
+          <a:xfrm>
+            <a:off x="1929384" y="6596390"/>
+            <a:ext cx="5285232" cy="261610"/>
+          </a:xfrm>
+          <a:prstGeom prst="rect">
+            <a:avLst/>
+          </a:prstGeom>
+          <a:noFill/>
+        </p:spPr>
+        <p:txBody>
+          <a:bodyPr wrap="square" rtlCol="0">
+            <a:spAutoFit/>
+          </a:bodyPr>
+          <a:lstStyle/>
+          <a:p>
+            <a:pPr algn="ctr"/>
+            <a:r>
+              <a:rPr lang="en-US" sz="1100" dirty="0">
+                <a:solidFill>
+                  <a:schemeClr val="bg1"/>
+                </a:solidFill>
+              </a:rPr>
+              <a:t>University of Bristol Study Space Booking App - SPE</a:t>
+            </a:r>
+          </a:p>
+        </p:txBody>
+      </p:sp>
     </p:spTree>
     <p:extLst>
       <p:ext uri="{BB962C8B-B14F-4D97-AF65-F5344CB8AC3E}">
@@ -3942,6 +3990,46 @@
           </a:p>
         </p:txBody>
       </p:sp>
+      <p:sp>
+        <p:nvSpPr>
+          <p:cNvPr id="4" name="TextBox 3">
+            <a:extLst>
+              <a:ext uri="{FF2B5EF4-FFF2-40B4-BE49-F238E27FC236}">
+                <a16:creationId xmlns:a16="http://schemas.microsoft.com/office/drawing/2014/main" id="{15F603CC-B7DA-9E49-963A-F587A7463745}"/>
+              </a:ext>
+            </a:extLst>
+          </p:cNvPr>
+          <p:cNvSpPr txBox="1"/>
+          <p:nvPr/>
+        </p:nvSpPr>
+        <p:spPr>
+          <a:xfrm>
+            <a:off x="1929384" y="6596390"/>
+            <a:ext cx="5285232" cy="261610"/>
+          </a:xfrm>
+          <a:prstGeom prst="rect">
+            <a:avLst/>
+          </a:prstGeom>
+          <a:noFill/>
+        </p:spPr>
+        <p:txBody>
+          <a:bodyPr wrap="square" rtlCol="0">
+            <a:spAutoFit/>
+          </a:bodyPr>
+          <a:lstStyle/>
+          <a:p>
+            <a:pPr algn="ctr"/>
+            <a:r>
+              <a:rPr lang="en-US" sz="1100" dirty="0">
+                <a:solidFill>
+                  <a:schemeClr val="bg1"/>
+                </a:solidFill>
+              </a:rPr>
+              <a:t>University of Bristol Study Space Booking App - SPE</a:t>
+            </a:r>
+          </a:p>
+        </p:txBody>
+      </p:sp>
     </p:spTree>
     <p:extLst>
       <p:ext uri="{BB962C8B-B14F-4D97-AF65-F5344CB8AC3E}">
@@ -4227,6 +4315,46 @@
           </a:fontRef>
         </p:style>
       </p:cxnSp>
+      <p:sp>
+        <p:nvSpPr>
+          <p:cNvPr id="7" name="TextBox 6">
+            <a:extLst>
+              <a:ext uri="{FF2B5EF4-FFF2-40B4-BE49-F238E27FC236}">
+                <a16:creationId xmlns:a16="http://schemas.microsoft.com/office/drawing/2014/main" id="{9322EE92-27F7-F243-9249-3564092ED76B}"/>
+              </a:ext>
+            </a:extLst>
+          </p:cNvPr>
+          <p:cNvSpPr txBox="1"/>
+          <p:nvPr/>
+        </p:nvSpPr>
+        <p:spPr>
+          <a:xfrm>
+            <a:off x="1929384" y="6596390"/>
+            <a:ext cx="5285232" cy="261610"/>
+          </a:xfrm>
+          <a:prstGeom prst="rect">
+            <a:avLst/>
+          </a:prstGeom>
+          <a:noFill/>
+        </p:spPr>
+        <p:txBody>
+          <a:bodyPr wrap="square" rtlCol="0">
+            <a:spAutoFit/>
+          </a:bodyPr>
+          <a:lstStyle/>
+          <a:p>
+            <a:pPr algn="ctr"/>
+            <a:r>
+              <a:rPr lang="en-US" sz="1100" dirty="0">
+                <a:solidFill>
+                  <a:schemeClr val="bg1"/>
+                </a:solidFill>
+              </a:rPr>
+              <a:t>University of Bristol Study Space Booking App - SPE</a:t>
+            </a:r>
+          </a:p>
+        </p:txBody>
+      </p:sp>
     </p:spTree>
     <p:extLst>
       <p:ext uri="{BB962C8B-B14F-4D97-AF65-F5344CB8AC3E}">
@@ -4377,6 +4505,46 @@
           </a:p>
         </p:txBody>
       </p:sp>
+      <p:sp>
+        <p:nvSpPr>
+          <p:cNvPr id="4" name="TextBox 3">
+            <a:extLst>
+              <a:ext uri="{FF2B5EF4-FFF2-40B4-BE49-F238E27FC236}">
+                <a16:creationId xmlns:a16="http://schemas.microsoft.com/office/drawing/2014/main" id="{17FD1C00-81F6-3D45-AFEA-50B037B75694}"/>
+              </a:ext>
+            </a:extLst>
+          </p:cNvPr>
+          <p:cNvSpPr txBox="1"/>
+          <p:nvPr/>
+        </p:nvSpPr>
+        <p:spPr>
+          <a:xfrm>
+            <a:off x="1929384" y="6596390"/>
+            <a:ext cx="5285232" cy="261610"/>
+          </a:xfrm>
+          <a:prstGeom prst="rect">
+            <a:avLst/>
+          </a:prstGeom>
+          <a:noFill/>
+        </p:spPr>
+        <p:txBody>
+          <a:bodyPr wrap="square" rtlCol="0">
+            <a:spAutoFit/>
+          </a:bodyPr>
+          <a:lstStyle/>
+          <a:p>
+            <a:pPr algn="ctr"/>
+            <a:r>
+              <a:rPr lang="en-US" sz="1100" dirty="0">
+                <a:solidFill>
+                  <a:schemeClr val="bg1"/>
+                </a:solidFill>
+              </a:rPr>
+              <a:t>University of Bristol Study Space Booking App - SPE</a:t>
+            </a:r>
+          </a:p>
+        </p:txBody>
+      </p:sp>
     </p:spTree>
     <p:extLst>
       <p:ext uri="{BB962C8B-B14F-4D97-AF65-F5344CB8AC3E}">
@@ -4609,6 +4777,46 @@
           </a:fontRef>
         </p:style>
       </p:cxnSp>
+      <p:sp>
+        <p:nvSpPr>
+          <p:cNvPr id="7" name="TextBox 6">
+            <a:extLst>
+              <a:ext uri="{FF2B5EF4-FFF2-40B4-BE49-F238E27FC236}">
+                <a16:creationId xmlns:a16="http://schemas.microsoft.com/office/drawing/2014/main" id="{FB7B0521-0EC3-0D4E-AB34-AD37E036704C}"/>
+              </a:ext>
+            </a:extLst>
+          </p:cNvPr>
+          <p:cNvSpPr txBox="1"/>
+          <p:nvPr/>
+        </p:nvSpPr>
+        <p:spPr>
+          <a:xfrm>
+            <a:off x="1929384" y="6596390"/>
+            <a:ext cx="5285232" cy="261610"/>
+          </a:xfrm>
+          <a:prstGeom prst="rect">
+            <a:avLst/>
+          </a:prstGeom>
+          <a:noFill/>
+        </p:spPr>
+        <p:txBody>
+          <a:bodyPr wrap="square" rtlCol="0">
+            <a:spAutoFit/>
+          </a:bodyPr>
+          <a:lstStyle/>
+          <a:p>
+            <a:pPr algn="ctr"/>
+            <a:r>
+              <a:rPr lang="en-US" sz="1100" dirty="0">
+                <a:solidFill>
+                  <a:schemeClr val="bg1"/>
+                </a:solidFill>
+              </a:rPr>
+              <a:t>University of Bristol Study Space Booking App - SPE</a:t>
+            </a:r>
+          </a:p>
+        </p:txBody>
+      </p:sp>
     </p:spTree>
     <p:extLst>
       <p:ext uri="{BB962C8B-B14F-4D97-AF65-F5344CB8AC3E}">
@@ -4879,6 +5087,46 @@
           </a:p>
         </p:txBody>
       </p:sp>
+      <p:sp>
+        <p:nvSpPr>
+          <p:cNvPr id="9" name="TextBox 8">
+            <a:extLst>
+              <a:ext uri="{FF2B5EF4-FFF2-40B4-BE49-F238E27FC236}">
+                <a16:creationId xmlns:a16="http://schemas.microsoft.com/office/drawing/2014/main" id="{CFA287EF-4DB8-154E-AD35-74214986203C}"/>
+              </a:ext>
+            </a:extLst>
+          </p:cNvPr>
+          <p:cNvSpPr txBox="1"/>
+          <p:nvPr/>
+        </p:nvSpPr>
+        <p:spPr>
+          <a:xfrm>
+            <a:off x="1929384" y="6596390"/>
+            <a:ext cx="5285232" cy="261610"/>
+          </a:xfrm>
+          <a:prstGeom prst="rect">
+            <a:avLst/>
+          </a:prstGeom>
+          <a:noFill/>
+        </p:spPr>
+        <p:txBody>
+          <a:bodyPr wrap="square" rtlCol="0">
+            <a:spAutoFit/>
+          </a:bodyPr>
+          <a:lstStyle/>
+          <a:p>
+            <a:pPr algn="ctr"/>
+            <a:r>
+              <a:rPr lang="en-US" sz="1100" dirty="0">
+                <a:solidFill>
+                  <a:schemeClr val="bg1"/>
+                </a:solidFill>
+              </a:rPr>
+              <a:t>University of Bristol Study Space Booking App - SPE</a:t>
+            </a:r>
+          </a:p>
+        </p:txBody>
+      </p:sp>
     </p:spTree>
     <p:extLst>
       <p:ext uri="{BB962C8B-B14F-4D97-AF65-F5344CB8AC3E}">
@@ -5164,6 +5412,46 @@
           </a:fontRef>
         </p:style>
       </p:cxnSp>
+      <p:sp>
+        <p:nvSpPr>
+          <p:cNvPr id="7" name="TextBox 6">
+            <a:extLst>
+              <a:ext uri="{FF2B5EF4-FFF2-40B4-BE49-F238E27FC236}">
+                <a16:creationId xmlns:a16="http://schemas.microsoft.com/office/drawing/2014/main" id="{33304228-E329-5749-9C16-1F4C497456A6}"/>
+              </a:ext>
+            </a:extLst>
+          </p:cNvPr>
+          <p:cNvSpPr txBox="1"/>
+          <p:nvPr/>
+        </p:nvSpPr>
+        <p:spPr>
+          <a:xfrm>
+            <a:off x="1929384" y="6596390"/>
+            <a:ext cx="5285232" cy="261610"/>
+          </a:xfrm>
+          <a:prstGeom prst="rect">
+            <a:avLst/>
+          </a:prstGeom>
+          <a:noFill/>
+        </p:spPr>
+        <p:txBody>
+          <a:bodyPr wrap="square" rtlCol="0">
+            <a:spAutoFit/>
+          </a:bodyPr>
+          <a:lstStyle/>
+          <a:p>
+            <a:pPr algn="ctr"/>
+            <a:r>
+              <a:rPr lang="en-US" sz="1100" dirty="0">
+                <a:solidFill>
+                  <a:schemeClr val="bg1"/>
+                </a:solidFill>
+              </a:rPr>
+              <a:t>University of Bristol Study Space Booking App - SPE</a:t>
+            </a:r>
+          </a:p>
+        </p:txBody>
+      </p:sp>
     </p:spTree>
     <p:extLst>
       <p:ext uri="{BB962C8B-B14F-4D97-AF65-F5344CB8AC3E}">
@@ -5515,7 +5803,7 @@
         </p:nvSpPr>
         <p:spPr>
           <a:xfrm>
-            <a:off x="4689100" y="1781188"/>
+            <a:off x="2726473" y="400102"/>
             <a:ext cx="3691054" cy="369332"/>
           </a:xfrm>
           <a:prstGeom prst="rect">
@@ -5535,7 +5823,7 @@
                   <a:schemeClr val="bg1"/>
                 </a:solidFill>
               </a:rPr>
-              <a:t>This page displays your  bookings.</a:t>
+              <a:t>This page displays your bookings.</a:t>
             </a:r>
           </a:p>
         </p:txBody>
@@ -5554,7 +5842,7 @@
         </p:nvSpPr>
         <p:spPr>
           <a:xfrm>
-            <a:off x="4689100" y="3429000"/>
+            <a:off x="5335871" y="3908503"/>
             <a:ext cx="3691054" cy="646331"/>
           </a:xfrm>
           <a:prstGeom prst="rect">
@@ -5575,6 +5863,208 @@
                 </a:solidFill>
               </a:rPr>
               <a:t>Click here to see more information about a booking.</a:t>
+            </a:r>
+          </a:p>
+        </p:txBody>
+      </p:sp>
+      <p:pic>
+        <p:nvPicPr>
+          <p:cNvPr id="3" name="Picture 2">
+            <a:extLst>
+              <a:ext uri="{FF2B5EF4-FFF2-40B4-BE49-F238E27FC236}">
+                <a16:creationId xmlns:a16="http://schemas.microsoft.com/office/drawing/2014/main" id="{ECB712DA-2F00-154C-9F02-35830EF8E2F2}"/>
+              </a:ext>
+            </a:extLst>
+          </p:cNvPr>
+          <p:cNvPicPr>
+            <a:picLocks noChangeAspect="1"/>
+          </p:cNvPicPr>
+          <p:nvPr/>
+        </p:nvPicPr>
+        <p:blipFill>
+          <a:blip r:embed="rId2"/>
+          <a:stretch>
+            <a:fillRect/>
+          </a:stretch>
+        </p:blipFill>
+        <p:spPr>
+          <a:xfrm>
+            <a:off x="231913" y="1062658"/>
+            <a:ext cx="4457187" cy="5025908"/>
+          </a:xfrm>
+          <a:prstGeom prst="rect">
+            <a:avLst/>
+          </a:prstGeom>
+        </p:spPr>
+      </p:pic>
+      <p:sp>
+        <p:nvSpPr>
+          <p:cNvPr id="7" name="TextBox 6">
+            <a:extLst>
+              <a:ext uri="{FF2B5EF4-FFF2-40B4-BE49-F238E27FC236}">
+                <a16:creationId xmlns:a16="http://schemas.microsoft.com/office/drawing/2014/main" id="{1992CA42-B804-D74F-84E6-C5409B6A455B}"/>
+              </a:ext>
+            </a:extLst>
+          </p:cNvPr>
+          <p:cNvSpPr txBox="1"/>
+          <p:nvPr/>
+        </p:nvSpPr>
+        <p:spPr>
+          <a:xfrm>
+            <a:off x="5335871" y="1692637"/>
+            <a:ext cx="3691054" cy="369332"/>
+          </a:xfrm>
+          <a:prstGeom prst="rect">
+            <a:avLst/>
+          </a:prstGeom>
+          <a:noFill/>
+        </p:spPr>
+        <p:txBody>
+          <a:bodyPr wrap="square" rtlCol="0">
+            <a:spAutoFit/>
+          </a:bodyPr>
+          <a:lstStyle/>
+          <a:p>
+            <a:r>
+              <a:rPr lang="en-US" dirty="0">
+                <a:solidFill>
+                  <a:schemeClr val="bg1"/>
+                </a:solidFill>
+              </a:rPr>
+              <a:t>Click here to add a new booking</a:t>
+            </a:r>
+          </a:p>
+        </p:txBody>
+      </p:sp>
+      <p:cxnSp>
+        <p:nvCxnSpPr>
+          <p:cNvPr id="8" name="Straight Arrow Connector 7">
+            <a:extLst>
+              <a:ext uri="{FF2B5EF4-FFF2-40B4-BE49-F238E27FC236}">
+                <a16:creationId xmlns:a16="http://schemas.microsoft.com/office/drawing/2014/main" id="{5F6617AC-14BC-884C-98DE-14EF3FE96267}"/>
+              </a:ext>
+            </a:extLst>
+          </p:cNvPr>
+          <p:cNvCxnSpPr>
+            <a:cxnSpLocks/>
+            <a:stCxn id="7" idx="1"/>
+          </p:cNvCxnSpPr>
+          <p:nvPr/>
+        </p:nvCxnSpPr>
+        <p:spPr>
+          <a:xfrm flipH="1" flipV="1">
+            <a:off x="4638907" y="1639229"/>
+            <a:ext cx="696964" cy="238074"/>
+          </a:xfrm>
+          <a:prstGeom prst="straightConnector1">
+            <a:avLst/>
+          </a:prstGeom>
+          <a:ln w="31750">
+            <a:solidFill>
+              <a:schemeClr val="bg2">
+                <a:lumMod val="75000"/>
+              </a:schemeClr>
+            </a:solidFill>
+            <a:tailEnd type="triangle"/>
+          </a:ln>
+        </p:spPr>
+        <p:style>
+          <a:lnRef idx="1">
+            <a:schemeClr val="accent1"/>
+          </a:lnRef>
+          <a:fillRef idx="0">
+            <a:schemeClr val="accent1"/>
+          </a:fillRef>
+          <a:effectRef idx="0">
+            <a:schemeClr val="accent1"/>
+          </a:effectRef>
+          <a:fontRef idx="minor">
+            <a:schemeClr val="tx1"/>
+          </a:fontRef>
+        </p:style>
+      </p:cxnSp>
+      <p:cxnSp>
+        <p:nvCxnSpPr>
+          <p:cNvPr id="9" name="Straight Arrow Connector 8">
+            <a:extLst>
+              <a:ext uri="{FF2B5EF4-FFF2-40B4-BE49-F238E27FC236}">
+                <a16:creationId xmlns:a16="http://schemas.microsoft.com/office/drawing/2014/main" id="{E9FC4778-A284-6445-AD91-A99EF8FD865C}"/>
+              </a:ext>
+            </a:extLst>
+          </p:cNvPr>
+          <p:cNvCxnSpPr>
+            <a:cxnSpLocks/>
+          </p:cNvCxnSpPr>
+          <p:nvPr/>
+        </p:nvCxnSpPr>
+        <p:spPr>
+          <a:xfrm flipH="1" flipV="1">
+            <a:off x="4516244" y="3624146"/>
+            <a:ext cx="819627" cy="500250"/>
+          </a:xfrm>
+          <a:prstGeom prst="straightConnector1">
+            <a:avLst/>
+          </a:prstGeom>
+          <a:ln w="31750">
+            <a:solidFill>
+              <a:schemeClr val="bg2">
+                <a:lumMod val="75000"/>
+              </a:schemeClr>
+            </a:solidFill>
+            <a:tailEnd type="triangle"/>
+          </a:ln>
+        </p:spPr>
+        <p:style>
+          <a:lnRef idx="1">
+            <a:schemeClr val="accent1"/>
+          </a:lnRef>
+          <a:fillRef idx="0">
+            <a:schemeClr val="accent1"/>
+          </a:fillRef>
+          <a:effectRef idx="0">
+            <a:schemeClr val="accent1"/>
+          </a:effectRef>
+          <a:fontRef idx="minor">
+            <a:schemeClr val="tx1"/>
+          </a:fontRef>
+        </p:style>
+      </p:cxnSp>
+      <p:sp>
+        <p:nvSpPr>
+          <p:cNvPr id="13" name="TextBox 12">
+            <a:extLst>
+              <a:ext uri="{FF2B5EF4-FFF2-40B4-BE49-F238E27FC236}">
+                <a16:creationId xmlns:a16="http://schemas.microsoft.com/office/drawing/2014/main" id="{E00C108A-5353-8C40-A02C-7604E249ECC9}"/>
+              </a:ext>
+            </a:extLst>
+          </p:cNvPr>
+          <p:cNvSpPr txBox="1"/>
+          <p:nvPr/>
+        </p:nvSpPr>
+        <p:spPr>
+          <a:xfrm>
+            <a:off x="1929384" y="6596390"/>
+            <a:ext cx="5285232" cy="261610"/>
+          </a:xfrm>
+          <a:prstGeom prst="rect">
+            <a:avLst/>
+          </a:prstGeom>
+          <a:noFill/>
+        </p:spPr>
+        <p:txBody>
+          <a:bodyPr wrap="square" rtlCol="0">
+            <a:spAutoFit/>
+          </a:bodyPr>
+          <a:lstStyle/>
+          <a:p>
+            <a:pPr algn="ctr"/>
+            <a:r>
+              <a:rPr lang="en-US" sz="1100" dirty="0">
+                <a:solidFill>
+                  <a:schemeClr val="bg1"/>
+                </a:solidFill>
+              </a:rPr>
+              <a:t>University of Bristol Study Space Booking App - SPE</a:t>
             </a:r>
           </a:p>
         </p:txBody>
@@ -5817,6 +6307,92 @@
           </a:p>
         </p:txBody>
       </p:sp>
+      <p:cxnSp>
+        <p:nvCxnSpPr>
+          <p:cNvPr id="4" name="Straight Arrow Connector 3">
+            <a:extLst>
+              <a:ext uri="{FF2B5EF4-FFF2-40B4-BE49-F238E27FC236}">
+                <a16:creationId xmlns:a16="http://schemas.microsoft.com/office/drawing/2014/main" id="{D4FFD23B-FFF3-6C48-99C7-27AFCE94DC28}"/>
+              </a:ext>
+            </a:extLst>
+          </p:cNvPr>
+          <p:cNvCxnSpPr>
+            <a:cxnSpLocks/>
+          </p:cNvCxnSpPr>
+          <p:nvPr/>
+        </p:nvCxnSpPr>
+        <p:spPr>
+          <a:xfrm flipH="1">
+            <a:off x="3273552" y="3869122"/>
+            <a:ext cx="1298448" cy="995486"/>
+          </a:xfrm>
+          <a:prstGeom prst="straightConnector1">
+            <a:avLst/>
+          </a:prstGeom>
+          <a:ln w="31750">
+            <a:solidFill>
+              <a:schemeClr val="bg2">
+                <a:lumMod val="75000"/>
+              </a:schemeClr>
+            </a:solidFill>
+            <a:tailEnd type="triangle"/>
+          </a:ln>
+        </p:spPr>
+        <p:style>
+          <a:lnRef idx="1">
+            <a:schemeClr val="accent1"/>
+          </a:lnRef>
+          <a:fillRef idx="0">
+            <a:schemeClr val="accent1"/>
+          </a:fillRef>
+          <a:effectRef idx="0">
+            <a:schemeClr val="accent1"/>
+          </a:effectRef>
+          <a:fontRef idx="minor">
+            <a:schemeClr val="tx1"/>
+          </a:fontRef>
+        </p:style>
+      </p:cxnSp>
+      <p:sp>
+        <p:nvSpPr>
+          <p:cNvPr id="7" name="TextBox 6">
+            <a:extLst>
+              <a:ext uri="{FF2B5EF4-FFF2-40B4-BE49-F238E27FC236}">
+                <a16:creationId xmlns:a16="http://schemas.microsoft.com/office/drawing/2014/main" id="{B90DDDA6-AFFC-EA4D-8611-B9B08A28AA60}"/>
+              </a:ext>
+            </a:extLst>
+          </p:cNvPr>
+          <p:cNvSpPr txBox="1"/>
+          <p:nvPr/>
+        </p:nvSpPr>
+        <p:spPr>
+          <a:xfrm>
+            <a:off x="1929384" y="6596390"/>
+            <a:ext cx="5285232" cy="261610"/>
+          </a:xfrm>
+          <a:prstGeom prst="rect">
+            <a:avLst/>
+          </a:prstGeom>
+          <a:noFill/>
+        </p:spPr>
+        <p:txBody>
+          <a:bodyPr wrap="square" rtlCol="0">
+            <a:spAutoFit/>
+          </a:bodyPr>
+          <a:lstStyle/>
+          <a:p>
+            <a:pPr algn="ctr"/>
+            <a:r>
+              <a:rPr lang="en-US" sz="1100" dirty="0">
+                <a:solidFill>
+                  <a:schemeClr val="bg1"/>
+                </a:solidFill>
+              </a:rPr>
+              <a:t>University of Bristol Study Space Booking App - SPE</a:t>
+            </a:r>
+          </a:p>
+        </p:txBody>
+      </p:sp>
     </p:spTree>
     <p:extLst>
       <p:ext uri="{BB962C8B-B14F-4D97-AF65-F5344CB8AC3E}">
@@ -6055,6 +6631,46 @@
           </a:p>
         </p:txBody>
       </p:sp>
+      <p:sp>
+        <p:nvSpPr>
+          <p:cNvPr id="5" name="TextBox 4">
+            <a:extLst>
+              <a:ext uri="{FF2B5EF4-FFF2-40B4-BE49-F238E27FC236}">
+                <a16:creationId xmlns:a16="http://schemas.microsoft.com/office/drawing/2014/main" id="{36F74ACA-ED65-A14C-9077-961895EF87F1}"/>
+              </a:ext>
+            </a:extLst>
+          </p:cNvPr>
+          <p:cNvSpPr txBox="1"/>
+          <p:nvPr/>
+        </p:nvSpPr>
+        <p:spPr>
+          <a:xfrm>
+            <a:off x="1929384" y="6596390"/>
+            <a:ext cx="5285232" cy="261610"/>
+          </a:xfrm>
+          <a:prstGeom prst="rect">
+            <a:avLst/>
+          </a:prstGeom>
+          <a:noFill/>
+        </p:spPr>
+        <p:txBody>
+          <a:bodyPr wrap="square" rtlCol="0">
+            <a:spAutoFit/>
+          </a:bodyPr>
+          <a:lstStyle/>
+          <a:p>
+            <a:pPr algn="ctr"/>
+            <a:r>
+              <a:rPr lang="en-US" sz="1100" dirty="0">
+                <a:solidFill>
+                  <a:schemeClr val="bg1"/>
+                </a:solidFill>
+              </a:rPr>
+              <a:t>University of Bristol Study Space Booking App - SPE</a:t>
+            </a:r>
+          </a:p>
+        </p:txBody>
+      </p:sp>
     </p:spTree>
     <p:extLst>
       <p:ext uri="{BB962C8B-B14F-4D97-AF65-F5344CB8AC3E}">
@@ -6340,6 +6956,46 @@
           </a:fontRef>
         </p:style>
       </p:cxnSp>
+      <p:sp>
+        <p:nvSpPr>
+          <p:cNvPr id="7" name="TextBox 6">
+            <a:extLst>
+              <a:ext uri="{FF2B5EF4-FFF2-40B4-BE49-F238E27FC236}">
+                <a16:creationId xmlns:a16="http://schemas.microsoft.com/office/drawing/2014/main" id="{86D9ED84-D0DD-7D41-AB94-B37296F0D0AA}"/>
+              </a:ext>
+            </a:extLst>
+          </p:cNvPr>
+          <p:cNvSpPr txBox="1"/>
+          <p:nvPr/>
+        </p:nvSpPr>
+        <p:spPr>
+          <a:xfrm>
+            <a:off x="1929384" y="6596390"/>
+            <a:ext cx="5285232" cy="261610"/>
+          </a:xfrm>
+          <a:prstGeom prst="rect">
+            <a:avLst/>
+          </a:prstGeom>
+          <a:noFill/>
+        </p:spPr>
+        <p:txBody>
+          <a:bodyPr wrap="square" rtlCol="0">
+            <a:spAutoFit/>
+          </a:bodyPr>
+          <a:lstStyle/>
+          <a:p>
+            <a:pPr algn="ctr"/>
+            <a:r>
+              <a:rPr lang="en-US" sz="1100" dirty="0">
+                <a:solidFill>
+                  <a:schemeClr val="bg1"/>
+                </a:solidFill>
+              </a:rPr>
+              <a:t>University of Bristol Study Space Booking App - SPE</a:t>
+            </a:r>
+          </a:p>
+        </p:txBody>
+      </p:sp>
     </p:spTree>
     <p:extLst>
       <p:ext uri="{BB962C8B-B14F-4D97-AF65-F5344CB8AC3E}">
@@ -6629,6 +7285,46 @@
           </a:p>
         </p:txBody>
       </p:sp>
+      <p:sp>
+        <p:nvSpPr>
+          <p:cNvPr id="8" name="TextBox 7">
+            <a:extLst>
+              <a:ext uri="{FF2B5EF4-FFF2-40B4-BE49-F238E27FC236}">
+                <a16:creationId xmlns:a16="http://schemas.microsoft.com/office/drawing/2014/main" id="{8F2CDDAB-62D5-5B4B-9C1A-80A4191AAEEB}"/>
+              </a:ext>
+            </a:extLst>
+          </p:cNvPr>
+          <p:cNvSpPr txBox="1"/>
+          <p:nvPr/>
+        </p:nvSpPr>
+        <p:spPr>
+          <a:xfrm>
+            <a:off x="1929384" y="6596390"/>
+            <a:ext cx="5285232" cy="261610"/>
+          </a:xfrm>
+          <a:prstGeom prst="rect">
+            <a:avLst/>
+          </a:prstGeom>
+          <a:noFill/>
+        </p:spPr>
+        <p:txBody>
+          <a:bodyPr wrap="square" rtlCol="0">
+            <a:spAutoFit/>
+          </a:bodyPr>
+          <a:lstStyle/>
+          <a:p>
+            <a:pPr algn="ctr"/>
+            <a:r>
+              <a:rPr lang="en-US" sz="1100" dirty="0">
+                <a:solidFill>
+                  <a:schemeClr val="bg1"/>
+                </a:solidFill>
+              </a:rPr>
+              <a:t>University of Bristol Study Space Booking App - SPE</a:t>
+            </a:r>
+          </a:p>
+        </p:txBody>
+      </p:sp>
     </p:spTree>
     <p:extLst>
       <p:ext uri="{BB962C8B-B14F-4D97-AF65-F5344CB8AC3E}">
@@ -6944,6 +7640,46 @@
           </a:fontRef>
         </p:style>
       </p:cxnSp>
+      <p:sp>
+        <p:nvSpPr>
+          <p:cNvPr id="7" name="TextBox 6">
+            <a:extLst>
+              <a:ext uri="{FF2B5EF4-FFF2-40B4-BE49-F238E27FC236}">
+                <a16:creationId xmlns:a16="http://schemas.microsoft.com/office/drawing/2014/main" id="{CD85DD60-EB92-D44B-A05B-BAAAAB0871EC}"/>
+              </a:ext>
+            </a:extLst>
+          </p:cNvPr>
+          <p:cNvSpPr txBox="1"/>
+          <p:nvPr/>
+        </p:nvSpPr>
+        <p:spPr>
+          <a:xfrm>
+            <a:off x="1929384" y="6596390"/>
+            <a:ext cx="5285232" cy="261610"/>
+          </a:xfrm>
+          <a:prstGeom prst="rect">
+            <a:avLst/>
+          </a:prstGeom>
+          <a:noFill/>
+        </p:spPr>
+        <p:txBody>
+          <a:bodyPr wrap="square" rtlCol="0">
+            <a:spAutoFit/>
+          </a:bodyPr>
+          <a:lstStyle/>
+          <a:p>
+            <a:pPr algn="ctr"/>
+            <a:r>
+              <a:rPr lang="en-US" sz="1100" dirty="0">
+                <a:solidFill>
+                  <a:schemeClr val="bg1"/>
+                </a:solidFill>
+              </a:rPr>
+              <a:t>University of Bristol Study Space Booking App - SPE</a:t>
+            </a:r>
+          </a:p>
+        </p:txBody>
+      </p:sp>
     </p:spTree>
     <p:extLst>
       <p:ext uri="{BB962C8B-B14F-4D97-AF65-F5344CB8AC3E}">
@@ -7132,7 +7868,7 @@
         </p:nvSpPr>
         <p:spPr>
           <a:xfrm>
-            <a:off x="5324007" y="1407714"/>
+            <a:off x="2726473" y="463681"/>
             <a:ext cx="3691054" cy="646331"/>
           </a:xfrm>
           <a:prstGeom prst="rect">
@@ -7208,6 +7944,209 @@
                 </a:solidFill>
               </a:rPr>
               <a:t> button.</a:t>
+            </a:r>
+          </a:p>
+        </p:txBody>
+      </p:sp>
+      <p:pic>
+        <p:nvPicPr>
+          <p:cNvPr id="3" name="Picture 2">
+            <a:extLst>
+              <a:ext uri="{FF2B5EF4-FFF2-40B4-BE49-F238E27FC236}">
+                <a16:creationId xmlns:a16="http://schemas.microsoft.com/office/drawing/2014/main" id="{99C11A6E-ACA8-324C-8284-339151BB1834}"/>
+              </a:ext>
+            </a:extLst>
+          </p:cNvPr>
+          <p:cNvPicPr>
+            <a:picLocks noChangeAspect="1"/>
+          </p:cNvPicPr>
+          <p:nvPr/>
+        </p:nvPicPr>
+        <p:blipFill>
+          <a:blip r:embed="rId2"/>
+          <a:stretch>
+            <a:fillRect/>
+          </a:stretch>
+        </p:blipFill>
+        <p:spPr>
+          <a:xfrm>
+            <a:off x="368782" y="1834588"/>
+            <a:ext cx="4236565" cy="4236565"/>
+          </a:xfrm>
+          <a:prstGeom prst="rect">
+            <a:avLst/>
+          </a:prstGeom>
+        </p:spPr>
+      </p:pic>
+      <p:cxnSp>
+        <p:nvCxnSpPr>
+          <p:cNvPr id="6" name="Straight Arrow Connector 5">
+            <a:extLst>
+              <a:ext uri="{FF2B5EF4-FFF2-40B4-BE49-F238E27FC236}">
+                <a16:creationId xmlns:a16="http://schemas.microsoft.com/office/drawing/2014/main" id="{0592C188-F966-BF4F-AE55-026C63C60D66}"/>
+              </a:ext>
+            </a:extLst>
+          </p:cNvPr>
+          <p:cNvCxnSpPr>
+            <a:cxnSpLocks/>
+            <a:stCxn id="5" idx="1"/>
+          </p:cNvCxnSpPr>
+          <p:nvPr/>
+        </p:nvCxnSpPr>
+        <p:spPr>
+          <a:xfrm flipH="1" flipV="1">
+            <a:off x="4389120" y="4133088"/>
+            <a:ext cx="695044" cy="865740"/>
+          </a:xfrm>
+          <a:prstGeom prst="straightConnector1">
+            <a:avLst/>
+          </a:prstGeom>
+          <a:ln w="31750">
+            <a:solidFill>
+              <a:schemeClr val="bg2">
+                <a:lumMod val="75000"/>
+              </a:schemeClr>
+            </a:solidFill>
+            <a:tailEnd type="triangle"/>
+          </a:ln>
+        </p:spPr>
+        <p:style>
+          <a:lnRef idx="1">
+            <a:schemeClr val="accent1"/>
+          </a:lnRef>
+          <a:fillRef idx="0">
+            <a:schemeClr val="accent1"/>
+          </a:fillRef>
+          <a:effectRef idx="0">
+            <a:schemeClr val="accent1"/>
+          </a:effectRef>
+          <a:fontRef idx="minor">
+            <a:schemeClr val="tx1"/>
+          </a:fontRef>
+        </p:style>
+      </p:cxnSp>
+      <p:cxnSp>
+        <p:nvCxnSpPr>
+          <p:cNvPr id="7" name="Straight Arrow Connector 6">
+            <a:extLst>
+              <a:ext uri="{FF2B5EF4-FFF2-40B4-BE49-F238E27FC236}">
+                <a16:creationId xmlns:a16="http://schemas.microsoft.com/office/drawing/2014/main" id="{35274A73-BD7D-9E4A-A55E-ED8C71F56C01}"/>
+              </a:ext>
+            </a:extLst>
+          </p:cNvPr>
+          <p:cNvCxnSpPr>
+            <a:cxnSpLocks/>
+            <a:stCxn id="8" idx="1"/>
+          </p:cNvCxnSpPr>
+          <p:nvPr/>
+        </p:nvCxnSpPr>
+        <p:spPr>
+          <a:xfrm flipH="1" flipV="1">
+            <a:off x="4605347" y="2247287"/>
+            <a:ext cx="478817" cy="43014"/>
+          </a:xfrm>
+          <a:prstGeom prst="straightConnector1">
+            <a:avLst/>
+          </a:prstGeom>
+          <a:ln w="31750">
+            <a:solidFill>
+              <a:schemeClr val="bg2">
+                <a:lumMod val="75000"/>
+              </a:schemeClr>
+            </a:solidFill>
+            <a:tailEnd type="triangle"/>
+          </a:ln>
+        </p:spPr>
+        <p:style>
+          <a:lnRef idx="1">
+            <a:schemeClr val="accent1"/>
+          </a:lnRef>
+          <a:fillRef idx="0">
+            <a:schemeClr val="accent1"/>
+          </a:fillRef>
+          <a:effectRef idx="0">
+            <a:schemeClr val="accent1"/>
+          </a:effectRef>
+          <a:fontRef idx="minor">
+            <a:schemeClr val="tx1"/>
+          </a:fontRef>
+        </p:style>
+      </p:cxnSp>
+      <p:sp>
+        <p:nvSpPr>
+          <p:cNvPr id="8" name="TextBox 7">
+            <a:extLst>
+              <a:ext uri="{FF2B5EF4-FFF2-40B4-BE49-F238E27FC236}">
+                <a16:creationId xmlns:a16="http://schemas.microsoft.com/office/drawing/2014/main" id="{850A2480-D459-8642-9C60-D60F20A18941}"/>
+              </a:ext>
+            </a:extLst>
+          </p:cNvPr>
+          <p:cNvSpPr txBox="1"/>
+          <p:nvPr/>
+        </p:nvSpPr>
+        <p:spPr>
+          <a:xfrm>
+            <a:off x="5084164" y="2105635"/>
+            <a:ext cx="3691054" cy="369332"/>
+          </a:xfrm>
+          <a:prstGeom prst="rect">
+            <a:avLst/>
+          </a:prstGeom>
+          <a:noFill/>
+        </p:spPr>
+        <p:txBody>
+          <a:bodyPr wrap="square" rtlCol="0">
+            <a:spAutoFit/>
+          </a:bodyPr>
+          <a:lstStyle/>
+          <a:p>
+            <a:r>
+              <a:rPr lang="en-US" dirty="0">
+                <a:solidFill>
+                  <a:schemeClr val="bg1"/>
+                </a:solidFill>
+              </a:rPr>
+              <a:t>Click here to add a new user</a:t>
+            </a:r>
+          </a:p>
+        </p:txBody>
+      </p:sp>
+      <p:sp>
+        <p:nvSpPr>
+          <p:cNvPr id="13" name="TextBox 12">
+            <a:extLst>
+              <a:ext uri="{FF2B5EF4-FFF2-40B4-BE49-F238E27FC236}">
+                <a16:creationId xmlns:a16="http://schemas.microsoft.com/office/drawing/2014/main" id="{0830878F-A287-4C40-BC99-14B7B74AE4F0}"/>
+              </a:ext>
+            </a:extLst>
+          </p:cNvPr>
+          <p:cNvSpPr txBox="1"/>
+          <p:nvPr/>
+        </p:nvSpPr>
+        <p:spPr>
+          <a:xfrm>
+            <a:off x="1929384" y="6596390"/>
+            <a:ext cx="5285232" cy="261610"/>
+          </a:xfrm>
+          <a:prstGeom prst="rect">
+            <a:avLst/>
+          </a:prstGeom>
+          <a:noFill/>
+        </p:spPr>
+        <p:txBody>
+          <a:bodyPr wrap="square" rtlCol="0">
+            <a:spAutoFit/>
+          </a:bodyPr>
+          <a:lstStyle/>
+          <a:p>
+            <a:pPr algn="ctr"/>
+            <a:r>
+              <a:rPr lang="en-US" sz="1100" dirty="0">
+                <a:solidFill>
+                  <a:schemeClr val="bg1"/>
+                </a:solidFill>
+              </a:rPr>
+              <a:t>University of Bristol Study Space Booking App - SPE</a:t>
             </a:r>
           </a:p>
         </p:txBody>
@@ -7650,6 +8589,46 @@
           </a:fontRef>
         </p:style>
       </p:cxnSp>
+      <p:sp>
+        <p:nvSpPr>
+          <p:cNvPr id="11" name="TextBox 10">
+            <a:extLst>
+              <a:ext uri="{FF2B5EF4-FFF2-40B4-BE49-F238E27FC236}">
+                <a16:creationId xmlns:a16="http://schemas.microsoft.com/office/drawing/2014/main" id="{75839648-AC39-6046-BE66-DB31E457FF7E}"/>
+              </a:ext>
+            </a:extLst>
+          </p:cNvPr>
+          <p:cNvSpPr txBox="1"/>
+          <p:nvPr/>
+        </p:nvSpPr>
+        <p:spPr>
+          <a:xfrm>
+            <a:off x="1929384" y="6596390"/>
+            <a:ext cx="5285232" cy="261610"/>
+          </a:xfrm>
+          <a:prstGeom prst="rect">
+            <a:avLst/>
+          </a:prstGeom>
+          <a:noFill/>
+        </p:spPr>
+        <p:txBody>
+          <a:bodyPr wrap="square" rtlCol="0">
+            <a:spAutoFit/>
+          </a:bodyPr>
+          <a:lstStyle/>
+          <a:p>
+            <a:pPr algn="ctr"/>
+            <a:r>
+              <a:rPr lang="en-US" sz="1100" dirty="0">
+                <a:solidFill>
+                  <a:schemeClr val="bg1"/>
+                </a:solidFill>
+              </a:rPr>
+              <a:t>University of Bristol Study Space Booking App - SPE</a:t>
+            </a:r>
+          </a:p>
+        </p:txBody>
+      </p:sp>
     </p:spTree>
     <p:extLst>
       <p:ext uri="{BB962C8B-B14F-4D97-AF65-F5344CB8AC3E}">
@@ -7935,6 +8914,46 @@
           </a:fontRef>
         </p:style>
       </p:cxnSp>
+      <p:sp>
+        <p:nvSpPr>
+          <p:cNvPr id="7" name="TextBox 6">
+            <a:extLst>
+              <a:ext uri="{FF2B5EF4-FFF2-40B4-BE49-F238E27FC236}">
+                <a16:creationId xmlns:a16="http://schemas.microsoft.com/office/drawing/2014/main" id="{07CBD1DC-6EA1-834B-9CD2-2EE326507CC1}"/>
+              </a:ext>
+            </a:extLst>
+          </p:cNvPr>
+          <p:cNvSpPr txBox="1"/>
+          <p:nvPr/>
+        </p:nvSpPr>
+        <p:spPr>
+          <a:xfrm>
+            <a:off x="1929384" y="6596390"/>
+            <a:ext cx="5285232" cy="261610"/>
+          </a:xfrm>
+          <a:prstGeom prst="rect">
+            <a:avLst/>
+          </a:prstGeom>
+          <a:noFill/>
+        </p:spPr>
+        <p:txBody>
+          <a:bodyPr wrap="square" rtlCol="0">
+            <a:spAutoFit/>
+          </a:bodyPr>
+          <a:lstStyle/>
+          <a:p>
+            <a:pPr algn="ctr"/>
+            <a:r>
+              <a:rPr lang="en-US" sz="1100" dirty="0">
+                <a:solidFill>
+                  <a:schemeClr val="bg1"/>
+                </a:solidFill>
+              </a:rPr>
+              <a:t>University of Bristol Study Space Booking App - SPE</a:t>
+            </a:r>
+          </a:p>
+        </p:txBody>
+      </p:sp>
     </p:spTree>
     <p:extLst>
       <p:ext uri="{BB962C8B-B14F-4D97-AF65-F5344CB8AC3E}">
@@ -7965,37 +8984,664 @@
           <a:chExt cx="0" cy="0"/>
         </a:xfrm>
       </p:grpSpPr>
-      <p:sp>
-        <p:nvSpPr>
-          <p:cNvPr id="2" name="Title 1">
-            <a:extLst>
-              <a:ext uri="{FF2B5EF4-FFF2-40B4-BE49-F238E27FC236}">
-                <a16:creationId xmlns:a16="http://schemas.microsoft.com/office/drawing/2014/main" id="{C25BE830-11B7-004E-89C2-4430CCC27C1E}"/>
-              </a:ext>
-            </a:extLst>
-          </p:cNvPr>
-          <p:cNvSpPr>
-            <a:spLocks noGrp="1"/>
-          </p:cNvSpPr>
-          <p:nvPr>
-            <p:ph type="title"/>
-          </p:nvPr>
-        </p:nvSpPr>
-        <p:spPr/>
-        <p:txBody>
-          <a:bodyPr/>
-          <a:lstStyle/>
-          <a:p>
-            <a:endParaRPr lang="en-US"/>
-          </a:p>
-        </p:txBody>
-      </p:sp>
+      <p:pic>
+        <p:nvPicPr>
+          <p:cNvPr id="14" name="Picture 13">
+            <a:extLst>
+              <a:ext uri="{FF2B5EF4-FFF2-40B4-BE49-F238E27FC236}">
+                <a16:creationId xmlns:a16="http://schemas.microsoft.com/office/drawing/2014/main" id="{3C10249E-4AC3-C045-AC1D-D16C2456A1B9}"/>
+              </a:ext>
+            </a:extLst>
+          </p:cNvPr>
+          <p:cNvPicPr>
+            <a:picLocks noChangeAspect="1"/>
+          </p:cNvPicPr>
+          <p:nvPr/>
+        </p:nvPicPr>
+        <p:blipFill>
+          <a:blip r:embed="rId2"/>
+          <a:stretch>
+            <a:fillRect/>
+          </a:stretch>
+        </p:blipFill>
+        <p:spPr>
+          <a:xfrm>
+            <a:off x="465388" y="737499"/>
+            <a:ext cx="3012259" cy="5339915"/>
+          </a:xfrm>
+          <a:prstGeom prst="rect">
+            <a:avLst/>
+          </a:prstGeom>
+        </p:spPr>
+      </p:pic>
+      <p:sp>
+        <p:nvSpPr>
+          <p:cNvPr id="11" name="TextBox 10">
+            <a:extLst>
+              <a:ext uri="{FF2B5EF4-FFF2-40B4-BE49-F238E27FC236}">
+                <a16:creationId xmlns:a16="http://schemas.microsoft.com/office/drawing/2014/main" id="{219661EE-A150-C54B-9A39-95C6F3EA42F9}"/>
+              </a:ext>
+            </a:extLst>
+          </p:cNvPr>
+          <p:cNvSpPr txBox="1"/>
+          <p:nvPr/>
+        </p:nvSpPr>
+        <p:spPr>
+          <a:xfrm>
+            <a:off x="4987558" y="2967335"/>
+            <a:ext cx="3691054" cy="923330"/>
+          </a:xfrm>
+          <a:prstGeom prst="rect">
+            <a:avLst/>
+          </a:prstGeom>
+          <a:noFill/>
+        </p:spPr>
+        <p:txBody>
+          <a:bodyPr wrap="square" rtlCol="0">
+            <a:spAutoFit/>
+          </a:bodyPr>
+          <a:lstStyle/>
+          <a:p>
+            <a:r>
+              <a:rPr lang="en-US" dirty="0">
+                <a:solidFill>
+                  <a:schemeClr val="bg1"/>
+                </a:solidFill>
+              </a:rPr>
+              <a:t>Fill in these fields with the corresponding information, then click submit</a:t>
+            </a:r>
+          </a:p>
+        </p:txBody>
+      </p:sp>
+      <p:cxnSp>
+        <p:nvCxnSpPr>
+          <p:cNvPr id="12" name="Straight Arrow Connector 11">
+            <a:extLst>
+              <a:ext uri="{FF2B5EF4-FFF2-40B4-BE49-F238E27FC236}">
+                <a16:creationId xmlns:a16="http://schemas.microsoft.com/office/drawing/2014/main" id="{854EF685-1EA3-A447-9AEE-19426DA33394}"/>
+              </a:ext>
+            </a:extLst>
+          </p:cNvPr>
+          <p:cNvCxnSpPr>
+            <a:cxnSpLocks/>
+            <a:stCxn id="11" idx="1"/>
+          </p:cNvCxnSpPr>
+          <p:nvPr/>
+        </p:nvCxnSpPr>
+        <p:spPr>
+          <a:xfrm flipH="1" flipV="1">
+            <a:off x="3282848" y="1888762"/>
+            <a:ext cx="1704710" cy="1540238"/>
+          </a:xfrm>
+          <a:prstGeom prst="straightConnector1">
+            <a:avLst/>
+          </a:prstGeom>
+          <a:ln w="31750">
+            <a:solidFill>
+              <a:schemeClr val="bg2">
+                <a:lumMod val="75000"/>
+              </a:schemeClr>
+            </a:solidFill>
+            <a:tailEnd type="triangle"/>
+          </a:ln>
+        </p:spPr>
+        <p:style>
+          <a:lnRef idx="1">
+            <a:schemeClr val="accent1"/>
+          </a:lnRef>
+          <a:fillRef idx="0">
+            <a:schemeClr val="accent1"/>
+          </a:fillRef>
+          <a:effectRef idx="0">
+            <a:schemeClr val="accent1"/>
+          </a:effectRef>
+          <a:fontRef idx="minor">
+            <a:schemeClr val="tx1"/>
+          </a:fontRef>
+        </p:style>
+      </p:cxnSp>
+      <p:cxnSp>
+        <p:nvCxnSpPr>
+          <p:cNvPr id="15" name="Straight Arrow Connector 14">
+            <a:extLst>
+              <a:ext uri="{FF2B5EF4-FFF2-40B4-BE49-F238E27FC236}">
+                <a16:creationId xmlns:a16="http://schemas.microsoft.com/office/drawing/2014/main" id="{EEBF2C6F-0142-A346-AA62-712DD8C4B9A4}"/>
+              </a:ext>
+            </a:extLst>
+          </p:cNvPr>
+          <p:cNvCxnSpPr>
+            <a:cxnSpLocks/>
+            <a:stCxn id="11" idx="1"/>
+          </p:cNvCxnSpPr>
+          <p:nvPr/>
+        </p:nvCxnSpPr>
+        <p:spPr>
+          <a:xfrm flipH="1" flipV="1">
+            <a:off x="3326424" y="2350428"/>
+            <a:ext cx="1661134" cy="1078572"/>
+          </a:xfrm>
+          <a:prstGeom prst="straightConnector1">
+            <a:avLst/>
+          </a:prstGeom>
+          <a:ln w="31750">
+            <a:solidFill>
+              <a:schemeClr val="bg2">
+                <a:lumMod val="75000"/>
+              </a:schemeClr>
+            </a:solidFill>
+            <a:tailEnd type="triangle"/>
+          </a:ln>
+        </p:spPr>
+        <p:style>
+          <a:lnRef idx="1">
+            <a:schemeClr val="accent1"/>
+          </a:lnRef>
+          <a:fillRef idx="0">
+            <a:schemeClr val="accent1"/>
+          </a:fillRef>
+          <a:effectRef idx="0">
+            <a:schemeClr val="accent1"/>
+          </a:effectRef>
+          <a:fontRef idx="minor">
+            <a:schemeClr val="tx1"/>
+          </a:fontRef>
+        </p:style>
+      </p:cxnSp>
+      <p:cxnSp>
+        <p:nvCxnSpPr>
+          <p:cNvPr id="16" name="Straight Arrow Connector 15">
+            <a:extLst>
+              <a:ext uri="{FF2B5EF4-FFF2-40B4-BE49-F238E27FC236}">
+                <a16:creationId xmlns:a16="http://schemas.microsoft.com/office/drawing/2014/main" id="{5C0ED123-556B-1B4C-BA41-87E437413F7A}"/>
+              </a:ext>
+            </a:extLst>
+          </p:cNvPr>
+          <p:cNvCxnSpPr>
+            <a:cxnSpLocks/>
+            <a:stCxn id="11" idx="1"/>
+          </p:cNvCxnSpPr>
+          <p:nvPr/>
+        </p:nvCxnSpPr>
+        <p:spPr>
+          <a:xfrm flipH="1" flipV="1">
+            <a:off x="3326424" y="2889714"/>
+            <a:ext cx="1661134" cy="539286"/>
+          </a:xfrm>
+          <a:prstGeom prst="straightConnector1">
+            <a:avLst/>
+          </a:prstGeom>
+          <a:ln w="31750">
+            <a:solidFill>
+              <a:schemeClr val="bg2">
+                <a:lumMod val="75000"/>
+              </a:schemeClr>
+            </a:solidFill>
+            <a:tailEnd type="triangle"/>
+          </a:ln>
+        </p:spPr>
+        <p:style>
+          <a:lnRef idx="1">
+            <a:schemeClr val="accent1"/>
+          </a:lnRef>
+          <a:fillRef idx="0">
+            <a:schemeClr val="accent1"/>
+          </a:fillRef>
+          <a:effectRef idx="0">
+            <a:schemeClr val="accent1"/>
+          </a:effectRef>
+          <a:fontRef idx="minor">
+            <a:schemeClr val="tx1"/>
+          </a:fontRef>
+        </p:style>
+      </p:cxnSp>
+      <p:cxnSp>
+        <p:nvCxnSpPr>
+          <p:cNvPr id="17" name="Straight Arrow Connector 16">
+            <a:extLst>
+              <a:ext uri="{FF2B5EF4-FFF2-40B4-BE49-F238E27FC236}">
+                <a16:creationId xmlns:a16="http://schemas.microsoft.com/office/drawing/2014/main" id="{9B73F151-CE7B-2947-A0FC-8FDB7C09837E}"/>
+              </a:ext>
+            </a:extLst>
+          </p:cNvPr>
+          <p:cNvCxnSpPr>
+            <a:cxnSpLocks/>
+            <a:stCxn id="11" idx="1"/>
+          </p:cNvCxnSpPr>
+          <p:nvPr/>
+        </p:nvCxnSpPr>
+        <p:spPr>
+          <a:xfrm flipH="1" flipV="1">
+            <a:off x="3326426" y="3297838"/>
+            <a:ext cx="1661132" cy="131162"/>
+          </a:xfrm>
+          <a:prstGeom prst="straightConnector1">
+            <a:avLst/>
+          </a:prstGeom>
+          <a:ln w="31750">
+            <a:solidFill>
+              <a:schemeClr val="bg2">
+                <a:lumMod val="75000"/>
+              </a:schemeClr>
+            </a:solidFill>
+            <a:tailEnd type="triangle"/>
+          </a:ln>
+        </p:spPr>
+        <p:style>
+          <a:lnRef idx="1">
+            <a:schemeClr val="accent1"/>
+          </a:lnRef>
+          <a:fillRef idx="0">
+            <a:schemeClr val="accent1"/>
+          </a:fillRef>
+          <a:effectRef idx="0">
+            <a:schemeClr val="accent1"/>
+          </a:effectRef>
+          <a:fontRef idx="minor">
+            <a:schemeClr val="tx1"/>
+          </a:fontRef>
+        </p:style>
+      </p:cxnSp>
+      <p:sp>
+        <p:nvSpPr>
+          <p:cNvPr id="8" name="TextBox 7">
+            <a:extLst>
+              <a:ext uri="{FF2B5EF4-FFF2-40B4-BE49-F238E27FC236}">
+                <a16:creationId xmlns:a16="http://schemas.microsoft.com/office/drawing/2014/main" id="{2342873D-15EB-1B45-B3FA-C2D1CAAFC2A2}"/>
+              </a:ext>
+            </a:extLst>
+          </p:cNvPr>
+          <p:cNvSpPr txBox="1"/>
+          <p:nvPr/>
+        </p:nvSpPr>
+        <p:spPr>
+          <a:xfrm>
+            <a:off x="1929384" y="6596390"/>
+            <a:ext cx="5285232" cy="261610"/>
+          </a:xfrm>
+          <a:prstGeom prst="rect">
+            <a:avLst/>
+          </a:prstGeom>
+          <a:noFill/>
+        </p:spPr>
+        <p:txBody>
+          <a:bodyPr wrap="square" rtlCol="0">
+            <a:spAutoFit/>
+          </a:bodyPr>
+          <a:lstStyle/>
+          <a:p>
+            <a:pPr algn="ctr"/>
+            <a:r>
+              <a:rPr lang="en-US" sz="1100" dirty="0">
+                <a:solidFill>
+                  <a:schemeClr val="bg1"/>
+                </a:solidFill>
+              </a:rPr>
+              <a:t>University of Bristol Study Space Booking App - SPE</a:t>
+            </a:r>
+          </a:p>
+        </p:txBody>
+      </p:sp>
+    </p:spTree>
+    <p:extLst>
+      <p:ext uri="{BB962C8B-B14F-4D97-AF65-F5344CB8AC3E}">
+        <p14:creationId xmlns:p14="http://schemas.microsoft.com/office/powerpoint/2010/main" val="318291079"/>
+      </p:ext>
+    </p:extLst>
+  </p:cSld>
+  <p:clrMapOvr>
+    <a:masterClrMapping/>
+  </p:clrMapOvr>
+</p:sld>
+</file>
+
+<file path=ppt/slides/slide35.xml><?xml version="1.0" encoding="utf-8"?>
+<p:sld xmlns:a="http://schemas.openxmlformats.org/drawingml/2006/main" xmlns:r="http://schemas.openxmlformats.org/officeDocument/2006/relationships" xmlns:p="http://schemas.openxmlformats.org/presentationml/2006/main">
+  <p:cSld>
+    <p:spTree>
+      <p:nvGrpSpPr>
+        <p:cNvPr id="1" name=""/>
+        <p:cNvGrpSpPr/>
+        <p:nvPr/>
+      </p:nvGrpSpPr>
+      <p:grpSpPr>
+        <a:xfrm>
+          <a:off x="0" y="0"/>
+          <a:ext cx="0" cy="0"/>
+          <a:chOff x="0" y="0"/>
+          <a:chExt cx="0" cy="0"/>
+        </a:xfrm>
+      </p:grpSpPr>
+      <p:pic>
+        <p:nvPicPr>
+          <p:cNvPr id="4" name="Picture 3">
+            <a:extLst>
+              <a:ext uri="{FF2B5EF4-FFF2-40B4-BE49-F238E27FC236}">
+                <a16:creationId xmlns:a16="http://schemas.microsoft.com/office/drawing/2014/main" id="{0AFD0A45-9CBF-BA4A-8DB9-BCC73F8C9CD0}"/>
+              </a:ext>
+            </a:extLst>
+          </p:cNvPr>
+          <p:cNvPicPr>
+            <a:picLocks noChangeAspect="1"/>
+          </p:cNvPicPr>
+          <p:nvPr/>
+        </p:nvPicPr>
+        <p:blipFill rotWithShape="1">
+          <a:blip r:embed="rId2"/>
+          <a:srcRect r="71078"/>
+          <a:stretch/>
+        </p:blipFill>
+        <p:spPr>
+          <a:xfrm>
+            <a:off x="1174570" y="2551814"/>
+            <a:ext cx="1767582" cy="1754372"/>
+          </a:xfrm>
+          <a:prstGeom prst="rect">
+            <a:avLst/>
+          </a:prstGeom>
+        </p:spPr>
+      </p:pic>
+      <p:cxnSp>
+        <p:nvCxnSpPr>
+          <p:cNvPr id="5" name="Straight Connector 4">
+            <a:extLst>
+              <a:ext uri="{FF2B5EF4-FFF2-40B4-BE49-F238E27FC236}">
+                <a16:creationId xmlns:a16="http://schemas.microsoft.com/office/drawing/2014/main" id="{CE3343EB-67CE-AA4B-9A96-1D1B3577F73E}"/>
+              </a:ext>
+            </a:extLst>
+          </p:cNvPr>
+          <p:cNvCxnSpPr/>
+          <p:nvPr/>
+        </p:nvCxnSpPr>
+        <p:spPr>
+          <a:xfrm>
+            <a:off x="3680422" y="1685261"/>
+            <a:ext cx="0" cy="3487479"/>
+          </a:xfrm>
+          <a:prstGeom prst="line">
+            <a:avLst/>
+          </a:prstGeom>
+          <a:ln w="38100">
+            <a:solidFill>
+              <a:schemeClr val="bg1"/>
+            </a:solidFill>
+          </a:ln>
+        </p:spPr>
+        <p:style>
+          <a:lnRef idx="1">
+            <a:schemeClr val="accent1"/>
+          </a:lnRef>
+          <a:fillRef idx="0">
+            <a:schemeClr val="accent1"/>
+          </a:fillRef>
+          <a:effectRef idx="0">
+            <a:schemeClr val="accent1"/>
+          </a:effectRef>
+          <a:fontRef idx="minor">
+            <a:schemeClr val="tx1"/>
+          </a:fontRef>
+        </p:style>
+      </p:cxnSp>
+      <p:sp>
+        <p:nvSpPr>
+          <p:cNvPr id="6" name="TextBox 5">
+            <a:extLst>
+              <a:ext uri="{FF2B5EF4-FFF2-40B4-BE49-F238E27FC236}">
+                <a16:creationId xmlns:a16="http://schemas.microsoft.com/office/drawing/2014/main" id="{D8B5770B-AF73-EC4E-9CA8-813EE4888781}"/>
+              </a:ext>
+            </a:extLst>
+          </p:cNvPr>
+          <p:cNvSpPr txBox="1"/>
+          <p:nvPr/>
+        </p:nvSpPr>
+        <p:spPr>
+          <a:xfrm>
+            <a:off x="4337824" y="3136613"/>
+            <a:ext cx="4047893" cy="584775"/>
+          </a:xfrm>
+          <a:prstGeom prst="rect">
+            <a:avLst/>
+          </a:prstGeom>
+          <a:noFill/>
+        </p:spPr>
+        <p:txBody>
+          <a:bodyPr wrap="square" rtlCol="0">
+            <a:spAutoFit/>
+          </a:bodyPr>
+          <a:lstStyle/>
+          <a:p>
+            <a:r>
+              <a:rPr lang="en-US" sz="3200" dirty="0">
+                <a:solidFill>
+                  <a:schemeClr val="bg1"/>
+                </a:solidFill>
+              </a:rPr>
+              <a:t>Viewing statistics</a:t>
+            </a:r>
+          </a:p>
+        </p:txBody>
+      </p:sp>
+    </p:spTree>
+    <p:extLst>
+      <p:ext uri="{BB962C8B-B14F-4D97-AF65-F5344CB8AC3E}">
+        <p14:creationId xmlns:p14="http://schemas.microsoft.com/office/powerpoint/2010/main" val="2638719734"/>
+      </p:ext>
+    </p:extLst>
+  </p:cSld>
+  <p:clrMapOvr>
+    <a:masterClrMapping/>
+  </p:clrMapOvr>
+</p:sld>
+</file>
+
+<file path=ppt/slides/slide36.xml><?xml version="1.0" encoding="utf-8"?>
+<p:sld xmlns:a="http://schemas.openxmlformats.org/drawingml/2006/main" xmlns:r="http://schemas.openxmlformats.org/officeDocument/2006/relationships" xmlns:p="http://schemas.openxmlformats.org/presentationml/2006/main">
+  <p:cSld>
+    <p:spTree>
+      <p:nvGrpSpPr>
+        <p:cNvPr id="1" name=""/>
+        <p:cNvGrpSpPr/>
+        <p:nvPr/>
+      </p:nvGrpSpPr>
+      <p:grpSpPr>
+        <a:xfrm>
+          <a:off x="0" y="0"/>
+          <a:ext cx="0" cy="0"/>
+          <a:chOff x="0" y="0"/>
+          <a:chExt cx="0" cy="0"/>
+        </a:xfrm>
+      </p:grpSpPr>
+      <p:pic>
+        <p:nvPicPr>
+          <p:cNvPr id="4" name="Picture 3">
+            <a:extLst>
+              <a:ext uri="{FF2B5EF4-FFF2-40B4-BE49-F238E27FC236}">
+                <a16:creationId xmlns:a16="http://schemas.microsoft.com/office/drawing/2014/main" id="{DA1009A1-62CB-E545-93B8-5C3DDBF59DDF}"/>
+              </a:ext>
+            </a:extLst>
+          </p:cNvPr>
+          <p:cNvPicPr>
+            <a:picLocks noChangeAspect="1"/>
+          </p:cNvPicPr>
+          <p:nvPr/>
+        </p:nvPicPr>
+        <p:blipFill>
+          <a:blip r:embed="rId2"/>
+          <a:stretch>
+            <a:fillRect/>
+          </a:stretch>
+        </p:blipFill>
+        <p:spPr>
+          <a:xfrm>
+            <a:off x="465390" y="737501"/>
+            <a:ext cx="3012258" cy="5339913"/>
+          </a:xfrm>
+          <a:prstGeom prst="rect">
+            <a:avLst/>
+          </a:prstGeom>
+        </p:spPr>
+      </p:pic>
+      <p:sp>
+        <p:nvSpPr>
+          <p:cNvPr id="5" name="TextBox 4">
+            <a:extLst>
+              <a:ext uri="{FF2B5EF4-FFF2-40B4-BE49-F238E27FC236}">
+                <a16:creationId xmlns:a16="http://schemas.microsoft.com/office/drawing/2014/main" id="{26EF07A2-94BA-F64B-AF79-CE6190149C4B}"/>
+              </a:ext>
+            </a:extLst>
+          </p:cNvPr>
+          <p:cNvSpPr txBox="1"/>
+          <p:nvPr/>
+        </p:nvSpPr>
+        <p:spPr>
+          <a:xfrm>
+            <a:off x="4987556" y="4082362"/>
+            <a:ext cx="3691054" cy="646331"/>
+          </a:xfrm>
+          <a:prstGeom prst="rect">
+            <a:avLst/>
+          </a:prstGeom>
+          <a:noFill/>
+        </p:spPr>
+        <p:txBody>
+          <a:bodyPr wrap="square" rtlCol="0">
+            <a:spAutoFit/>
+          </a:bodyPr>
+          <a:lstStyle/>
+          <a:p>
+            <a:r>
+              <a:rPr lang="en-US" dirty="0">
+                <a:solidFill>
+                  <a:schemeClr val="bg1"/>
+                </a:solidFill>
+              </a:rPr>
+              <a:t>From the administrator home screen, users should click ‘View Statistics’</a:t>
+            </a:r>
+          </a:p>
+        </p:txBody>
+      </p:sp>
+      <p:cxnSp>
+        <p:nvCxnSpPr>
+          <p:cNvPr id="6" name="Straight Arrow Connector 5">
+            <a:extLst>
+              <a:ext uri="{FF2B5EF4-FFF2-40B4-BE49-F238E27FC236}">
+                <a16:creationId xmlns:a16="http://schemas.microsoft.com/office/drawing/2014/main" id="{61855315-7D57-4943-AD6C-80D85D95EBBF}"/>
+              </a:ext>
+            </a:extLst>
+          </p:cNvPr>
+          <p:cNvCxnSpPr>
+            <a:cxnSpLocks/>
+            <a:stCxn id="5" idx="1"/>
+          </p:cNvCxnSpPr>
+          <p:nvPr/>
+        </p:nvCxnSpPr>
+        <p:spPr>
+          <a:xfrm flipH="1" flipV="1">
+            <a:off x="3297836" y="4182256"/>
+            <a:ext cx="1689720" cy="223272"/>
+          </a:xfrm>
+          <a:prstGeom prst="straightConnector1">
+            <a:avLst/>
+          </a:prstGeom>
+          <a:ln w="31750">
+            <a:solidFill>
+              <a:schemeClr val="bg2">
+                <a:lumMod val="75000"/>
+              </a:schemeClr>
+            </a:solidFill>
+            <a:tailEnd type="triangle"/>
+          </a:ln>
+        </p:spPr>
+        <p:style>
+          <a:lnRef idx="1">
+            <a:schemeClr val="accent1"/>
+          </a:lnRef>
+          <a:fillRef idx="0">
+            <a:schemeClr val="accent1"/>
+          </a:fillRef>
+          <a:effectRef idx="0">
+            <a:schemeClr val="accent1"/>
+          </a:effectRef>
+          <a:fontRef idx="minor">
+            <a:schemeClr val="tx1"/>
+          </a:fontRef>
+        </p:style>
+      </p:cxnSp>
+      <p:sp>
+        <p:nvSpPr>
+          <p:cNvPr id="7" name="TextBox 6">
+            <a:extLst>
+              <a:ext uri="{FF2B5EF4-FFF2-40B4-BE49-F238E27FC236}">
+                <a16:creationId xmlns:a16="http://schemas.microsoft.com/office/drawing/2014/main" id="{327D540B-39D4-374C-A743-85C86C20C52A}"/>
+              </a:ext>
+            </a:extLst>
+          </p:cNvPr>
+          <p:cNvSpPr txBox="1"/>
+          <p:nvPr/>
+        </p:nvSpPr>
+        <p:spPr>
+          <a:xfrm>
+            <a:off x="1929384" y="6596390"/>
+            <a:ext cx="5285232" cy="261610"/>
+          </a:xfrm>
+          <a:prstGeom prst="rect">
+            <a:avLst/>
+          </a:prstGeom>
+          <a:noFill/>
+        </p:spPr>
+        <p:txBody>
+          <a:bodyPr wrap="square" rtlCol="0">
+            <a:spAutoFit/>
+          </a:bodyPr>
+          <a:lstStyle/>
+          <a:p>
+            <a:pPr algn="ctr"/>
+            <a:r>
+              <a:rPr lang="en-US" sz="1100" dirty="0">
+                <a:solidFill>
+                  <a:schemeClr val="bg1"/>
+                </a:solidFill>
+              </a:rPr>
+              <a:t>University of Bristol Study Space Booking App - SPE</a:t>
+            </a:r>
+          </a:p>
+        </p:txBody>
+      </p:sp>
+    </p:spTree>
+    <p:extLst>
+      <p:ext uri="{BB962C8B-B14F-4D97-AF65-F5344CB8AC3E}">
+        <p14:creationId xmlns:p14="http://schemas.microsoft.com/office/powerpoint/2010/main" val="2830761211"/>
+      </p:ext>
+    </p:extLst>
+  </p:cSld>
+  <p:clrMapOvr>
+    <a:masterClrMapping/>
+  </p:clrMapOvr>
+</p:sld>
+</file>
+
+<file path=ppt/slides/slide37.xml><?xml version="1.0" encoding="utf-8"?>
+<p:sld xmlns:a="http://schemas.openxmlformats.org/drawingml/2006/main" xmlns:r="http://schemas.openxmlformats.org/officeDocument/2006/relationships" xmlns:p="http://schemas.openxmlformats.org/presentationml/2006/main">
+  <p:cSld>
+    <p:spTree>
+      <p:nvGrpSpPr>
+        <p:cNvPr id="1" name=""/>
+        <p:cNvGrpSpPr/>
+        <p:nvPr/>
+      </p:nvGrpSpPr>
+      <p:grpSpPr>
+        <a:xfrm>
+          <a:off x="0" y="0"/>
+          <a:ext cx="0" cy="0"/>
+          <a:chOff x="0" y="0"/>
+          <a:chExt cx="0" cy="0"/>
+        </a:xfrm>
+      </p:grpSpPr>
       <p:sp>
         <p:nvSpPr>
           <p:cNvPr id="3" name="Content Placeholder 2">
             <a:extLst>
               <a:ext uri="{FF2B5EF4-FFF2-40B4-BE49-F238E27FC236}">
-                <a16:creationId xmlns:a16="http://schemas.microsoft.com/office/drawing/2014/main" id="{6A41E400-A092-B547-B6A8-E390CF8D8FE5}"/>
+                <a16:creationId xmlns:a16="http://schemas.microsoft.com/office/drawing/2014/main" id="{7A6D2A7D-6C72-AE4B-A17C-04ADA644749E}"/>
               </a:ext>
             </a:extLst>
           </p:cNvPr>
@@ -8006,19 +9652,84 @@
             <p:ph idx="1"/>
           </p:nvPr>
         </p:nvSpPr>
-        <p:spPr/>
+        <p:spPr>
+          <a:xfrm>
+            <a:off x="628650" y="2939321"/>
+            <a:ext cx="7886700" cy="979359"/>
+          </a:xfrm>
+        </p:spPr>
         <p:txBody>
           <a:bodyPr/>
           <a:lstStyle/>
           <a:p>
-            <a:endParaRPr lang="en-US"/>
+            <a:pPr marL="0" indent="0">
+              <a:buNone/>
+            </a:pPr>
+            <a:r>
+              <a:rPr lang="en-US" dirty="0">
+                <a:solidFill>
+                  <a:schemeClr val="bg1"/>
+                </a:solidFill>
+              </a:rPr>
+              <a:t>For all further enquiries or questions please contact the Engineering Department in the Queens Building.</a:t>
+            </a:r>
+          </a:p>
+          <a:p>
+            <a:pPr marL="0" indent="0">
+              <a:buNone/>
+            </a:pPr>
+            <a:endParaRPr lang="en-US" dirty="0">
+              <a:solidFill>
+                <a:schemeClr val="bg1"/>
+              </a:solidFill>
+            </a:endParaRPr>
+          </a:p>
+        </p:txBody>
+      </p:sp>
+      <p:sp>
+        <p:nvSpPr>
+          <p:cNvPr id="2" name="TextBox 1">
+            <a:extLst>
+              <a:ext uri="{FF2B5EF4-FFF2-40B4-BE49-F238E27FC236}">
+                <a16:creationId xmlns:a16="http://schemas.microsoft.com/office/drawing/2014/main" id="{B3007A08-F810-8743-A1FE-E2AB4F5A17D8}"/>
+              </a:ext>
+            </a:extLst>
+          </p:cNvPr>
+          <p:cNvSpPr txBox="1"/>
+          <p:nvPr/>
+        </p:nvSpPr>
+        <p:spPr>
+          <a:xfrm>
+            <a:off x="1929384" y="6596390"/>
+            <a:ext cx="5285232" cy="261610"/>
+          </a:xfrm>
+          <a:prstGeom prst="rect">
+            <a:avLst/>
+          </a:prstGeom>
+          <a:noFill/>
+        </p:spPr>
+        <p:txBody>
+          <a:bodyPr wrap="square" rtlCol="0">
+            <a:spAutoFit/>
+          </a:bodyPr>
+          <a:lstStyle/>
+          <a:p>
+            <a:pPr algn="ctr"/>
+            <a:r>
+              <a:rPr lang="en-US" sz="1100" dirty="0">
+                <a:solidFill>
+                  <a:schemeClr val="bg1"/>
+                </a:solidFill>
+              </a:rPr>
+              <a:t>University of Bristol Study Space Booking App - SPE</a:t>
+            </a:r>
           </a:p>
         </p:txBody>
       </p:sp>
     </p:spTree>
     <p:extLst>
       <p:ext uri="{BB962C8B-B14F-4D97-AF65-F5344CB8AC3E}">
-        <p14:creationId xmlns:p14="http://schemas.microsoft.com/office/powerpoint/2010/main" val="318291079"/>
+        <p14:creationId xmlns:p14="http://schemas.microsoft.com/office/powerpoint/2010/main" val="3693994552"/>
       </p:ext>
     </p:extLst>
   </p:cSld>
@@ -8157,6 +9868,46 @@
                 </a:solidFill>
               </a:rPr>
               <a:t>This manual explains how to use the website correctly. Please read and understand thoroughly before using the product. For all further questions please contact the Engineering Department in the Queens Building.</a:t>
+            </a:r>
+          </a:p>
+        </p:txBody>
+      </p:sp>
+      <p:sp>
+        <p:nvSpPr>
+          <p:cNvPr id="3" name="TextBox 2">
+            <a:extLst>
+              <a:ext uri="{FF2B5EF4-FFF2-40B4-BE49-F238E27FC236}">
+                <a16:creationId xmlns:a16="http://schemas.microsoft.com/office/drawing/2014/main" id="{684DB57C-280B-6549-AC32-0AD403DB2ACB}"/>
+              </a:ext>
+            </a:extLst>
+          </p:cNvPr>
+          <p:cNvSpPr txBox="1"/>
+          <p:nvPr/>
+        </p:nvSpPr>
+        <p:spPr>
+          <a:xfrm>
+            <a:off x="1929384" y="6596390"/>
+            <a:ext cx="5285232" cy="261610"/>
+          </a:xfrm>
+          <a:prstGeom prst="rect">
+            <a:avLst/>
+          </a:prstGeom>
+          <a:noFill/>
+        </p:spPr>
+        <p:txBody>
+          <a:bodyPr wrap="square" rtlCol="0">
+            <a:spAutoFit/>
+          </a:bodyPr>
+          <a:lstStyle/>
+          <a:p>
+            <a:pPr algn="ctr"/>
+            <a:r>
+              <a:rPr lang="en-US" sz="1100" dirty="0">
+                <a:solidFill>
+                  <a:schemeClr val="bg1"/>
+                </a:solidFill>
+              </a:rPr>
+              <a:t>University of Bristol Study Space Booking App - SPE</a:t>
             </a:r>
           </a:p>
         </p:txBody>
@@ -8709,6 +10460,46 @@
           </a:fontRef>
         </p:style>
       </p:cxnSp>
+      <p:sp>
+        <p:nvSpPr>
+          <p:cNvPr id="11" name="TextBox 10">
+            <a:extLst>
+              <a:ext uri="{FF2B5EF4-FFF2-40B4-BE49-F238E27FC236}">
+                <a16:creationId xmlns:a16="http://schemas.microsoft.com/office/drawing/2014/main" id="{188D6205-08CF-BB4F-9896-15D038ABD238}"/>
+              </a:ext>
+            </a:extLst>
+          </p:cNvPr>
+          <p:cNvSpPr txBox="1"/>
+          <p:nvPr/>
+        </p:nvSpPr>
+        <p:spPr>
+          <a:xfrm>
+            <a:off x="1929384" y="6596390"/>
+            <a:ext cx="5285232" cy="261610"/>
+          </a:xfrm>
+          <a:prstGeom prst="rect">
+            <a:avLst/>
+          </a:prstGeom>
+          <a:noFill/>
+        </p:spPr>
+        <p:txBody>
+          <a:bodyPr wrap="square" rtlCol="0">
+            <a:spAutoFit/>
+          </a:bodyPr>
+          <a:lstStyle/>
+          <a:p>
+            <a:pPr algn="ctr"/>
+            <a:r>
+              <a:rPr lang="en-US" sz="1100" dirty="0">
+                <a:solidFill>
+                  <a:schemeClr val="bg1"/>
+                </a:solidFill>
+              </a:rPr>
+              <a:t>University of Bristol Study Space Booking App - SPE</a:t>
+            </a:r>
+          </a:p>
+        </p:txBody>
+      </p:sp>
     </p:spTree>
     <p:extLst>
       <p:ext uri="{BB962C8B-B14F-4D97-AF65-F5344CB8AC3E}">
@@ -8855,6 +10646,46 @@
           </a:fontRef>
         </p:style>
       </p:cxnSp>
+      <p:sp>
+        <p:nvSpPr>
+          <p:cNvPr id="5" name="TextBox 4">
+            <a:extLst>
+              <a:ext uri="{FF2B5EF4-FFF2-40B4-BE49-F238E27FC236}">
+                <a16:creationId xmlns:a16="http://schemas.microsoft.com/office/drawing/2014/main" id="{BEB88B2F-DEA3-7242-A6A3-98F06A2AB7B4}"/>
+              </a:ext>
+            </a:extLst>
+          </p:cNvPr>
+          <p:cNvSpPr txBox="1"/>
+          <p:nvPr/>
+        </p:nvSpPr>
+        <p:spPr>
+          <a:xfrm>
+            <a:off x="1929384" y="6596390"/>
+            <a:ext cx="5285232" cy="261610"/>
+          </a:xfrm>
+          <a:prstGeom prst="rect">
+            <a:avLst/>
+          </a:prstGeom>
+          <a:noFill/>
+        </p:spPr>
+        <p:txBody>
+          <a:bodyPr wrap="square" rtlCol="0">
+            <a:spAutoFit/>
+          </a:bodyPr>
+          <a:lstStyle/>
+          <a:p>
+            <a:pPr algn="ctr"/>
+            <a:r>
+              <a:rPr lang="en-US" sz="1100" dirty="0">
+                <a:solidFill>
+                  <a:schemeClr val="bg1"/>
+                </a:solidFill>
+              </a:rPr>
+              <a:t>University of Bristol Study Space Booking App - SPE</a:t>
+            </a:r>
+          </a:p>
+        </p:txBody>
+      </p:sp>
     </p:spTree>
     <p:extLst>
       <p:ext uri="{BB962C8B-B14F-4D97-AF65-F5344CB8AC3E}">
@@ -9001,6 +10832,46 @@
           </a:fontRef>
         </p:style>
       </p:cxnSp>
+      <p:sp>
+        <p:nvSpPr>
+          <p:cNvPr id="5" name="TextBox 4">
+            <a:extLst>
+              <a:ext uri="{FF2B5EF4-FFF2-40B4-BE49-F238E27FC236}">
+                <a16:creationId xmlns:a16="http://schemas.microsoft.com/office/drawing/2014/main" id="{337AB5AA-249F-8645-801C-67C4FD6AEEA5}"/>
+              </a:ext>
+            </a:extLst>
+          </p:cNvPr>
+          <p:cNvSpPr txBox="1"/>
+          <p:nvPr/>
+        </p:nvSpPr>
+        <p:spPr>
+          <a:xfrm>
+            <a:off x="1929384" y="6596390"/>
+            <a:ext cx="5285232" cy="261610"/>
+          </a:xfrm>
+          <a:prstGeom prst="rect">
+            <a:avLst/>
+          </a:prstGeom>
+          <a:noFill/>
+        </p:spPr>
+        <p:txBody>
+          <a:bodyPr wrap="square" rtlCol="0">
+            <a:spAutoFit/>
+          </a:bodyPr>
+          <a:lstStyle/>
+          <a:p>
+            <a:pPr algn="ctr"/>
+            <a:r>
+              <a:rPr lang="en-US" sz="1100" dirty="0">
+                <a:solidFill>
+                  <a:schemeClr val="bg1"/>
+                </a:solidFill>
+              </a:rPr>
+              <a:t>University of Bristol Study Space Booking App - SPE</a:t>
+            </a:r>
+          </a:p>
+        </p:txBody>
+      </p:sp>
     </p:spTree>
     <p:extLst>
       <p:ext uri="{BB962C8B-B14F-4D97-AF65-F5344CB8AC3E}">

</xml_diff>

<commit_message>
Updating user manual with admin view bookings
</commit_message>
<xml_diff>
--- a/Not_Main_Application/UserManual.pptx
+++ b/Not_Main_Application/UserManual.pptx
@@ -5,7 +5,7 @@
     <p:sldMasterId id="2147483660" r:id="rId1"/>
   </p:sldMasterIdLst>
   <p:notesMasterIdLst>
-    <p:notesMasterId r:id="rId39"/>
+    <p:notesMasterId r:id="rId42"/>
   </p:notesMasterIdLst>
   <p:sldIdLst>
     <p:sldId id="256" r:id="rId2"/>
@@ -43,8 +43,11 @@
     <p:sldId id="288" r:id="rId34"/>
     <p:sldId id="289" r:id="rId35"/>
     <p:sldId id="290" r:id="rId36"/>
-    <p:sldId id="291" r:id="rId37"/>
-    <p:sldId id="292" r:id="rId38"/>
+    <p:sldId id="294" r:id="rId37"/>
+    <p:sldId id="295" r:id="rId38"/>
+    <p:sldId id="293" r:id="rId39"/>
+    <p:sldId id="291" r:id="rId40"/>
+    <p:sldId id="292" r:id="rId41"/>
   </p:sldIdLst>
   <p:sldSz cx="9144000" cy="6858000" type="screen4x3"/>
   <p:notesSz cx="6858000" cy="9144000"/>
@@ -233,7 +236,7 @@
           <a:p>
             <a:fld id="{C128E5F2-3E43-A348-95A4-0CE0A417E92A}" type="datetimeFigureOut">
               <a:rPr lang="en-US" smtClean="0"/>
-              <a:t>4/17/19</a:t>
+              <a:t>4/18/19</a:t>
             </a:fld>
             <a:endParaRPr lang="en-US"/>
           </a:p>
@@ -715,7 +718,7 @@
           <a:p>
             <a:fld id="{79CC520B-3C03-A146-A34E-02F1D56BE37F}" type="datetimeFigureOut">
               <a:rPr lang="en-US" smtClean="0"/>
-              <a:t>4/17/19</a:t>
+              <a:t>4/18/19</a:t>
             </a:fld>
             <a:endParaRPr lang="en-US"/>
           </a:p>
@@ -885,7 +888,7 @@
           <a:p>
             <a:fld id="{79CC520B-3C03-A146-A34E-02F1D56BE37F}" type="datetimeFigureOut">
               <a:rPr lang="en-US" smtClean="0"/>
-              <a:t>4/17/19</a:t>
+              <a:t>4/18/19</a:t>
             </a:fld>
             <a:endParaRPr lang="en-US"/>
           </a:p>
@@ -1065,7 +1068,7 @@
           <a:p>
             <a:fld id="{79CC520B-3C03-A146-A34E-02F1D56BE37F}" type="datetimeFigureOut">
               <a:rPr lang="en-US" smtClean="0"/>
-              <a:t>4/17/19</a:t>
+              <a:t>4/18/19</a:t>
             </a:fld>
             <a:endParaRPr lang="en-US"/>
           </a:p>
@@ -1235,7 +1238,7 @@
           <a:p>
             <a:fld id="{79CC520B-3C03-A146-A34E-02F1D56BE37F}" type="datetimeFigureOut">
               <a:rPr lang="en-US" smtClean="0"/>
-              <a:t>4/17/19</a:t>
+              <a:t>4/18/19</a:t>
             </a:fld>
             <a:endParaRPr lang="en-US"/>
           </a:p>
@@ -1479,7 +1482,7 @@
           <a:p>
             <a:fld id="{79CC520B-3C03-A146-A34E-02F1D56BE37F}" type="datetimeFigureOut">
               <a:rPr lang="en-US" smtClean="0"/>
-              <a:t>4/17/19</a:t>
+              <a:t>4/18/19</a:t>
             </a:fld>
             <a:endParaRPr lang="en-US"/>
           </a:p>
@@ -1711,7 +1714,7 @@
           <a:p>
             <a:fld id="{79CC520B-3C03-A146-A34E-02F1D56BE37F}" type="datetimeFigureOut">
               <a:rPr lang="en-US" smtClean="0"/>
-              <a:t>4/17/19</a:t>
+              <a:t>4/18/19</a:t>
             </a:fld>
             <a:endParaRPr lang="en-US"/>
           </a:p>
@@ -2078,7 +2081,7 @@
           <a:p>
             <a:fld id="{79CC520B-3C03-A146-A34E-02F1D56BE37F}" type="datetimeFigureOut">
               <a:rPr lang="en-US" smtClean="0"/>
-              <a:t>4/17/19</a:t>
+              <a:t>4/18/19</a:t>
             </a:fld>
             <a:endParaRPr lang="en-US"/>
           </a:p>
@@ -2196,7 +2199,7 @@
           <a:p>
             <a:fld id="{79CC520B-3C03-A146-A34E-02F1D56BE37F}" type="datetimeFigureOut">
               <a:rPr lang="en-US" smtClean="0"/>
-              <a:t>4/17/19</a:t>
+              <a:t>4/18/19</a:t>
             </a:fld>
             <a:endParaRPr lang="en-US"/>
           </a:p>
@@ -2291,7 +2294,7 @@
           <a:p>
             <a:fld id="{79CC520B-3C03-A146-A34E-02F1D56BE37F}" type="datetimeFigureOut">
               <a:rPr lang="en-US" smtClean="0"/>
-              <a:t>4/17/19</a:t>
+              <a:t>4/18/19</a:t>
             </a:fld>
             <a:endParaRPr lang="en-US"/>
           </a:p>
@@ -2568,7 +2571,7 @@
           <a:p>
             <a:fld id="{79CC520B-3C03-A146-A34E-02F1D56BE37F}" type="datetimeFigureOut">
               <a:rPr lang="en-US" smtClean="0"/>
-              <a:t>4/17/19</a:t>
+              <a:t>4/18/19</a:t>
             </a:fld>
             <a:endParaRPr lang="en-US"/>
           </a:p>
@@ -2825,7 +2828,7 @@
           <a:p>
             <a:fld id="{79CC520B-3C03-A146-A34E-02F1D56BE37F}" type="datetimeFigureOut">
               <a:rPr lang="en-US" smtClean="0"/>
-              <a:t>4/17/19</a:t>
+              <a:t>4/18/19</a:t>
             </a:fld>
             <a:endParaRPr lang="en-US"/>
           </a:p>
@@ -3041,7 +3044,7 @@
           <a:p>
             <a:fld id="{79CC520B-3C03-A146-A34E-02F1D56BE37F}" type="datetimeFigureOut">
               <a:rPr lang="en-US" smtClean="0"/>
-              <a:t>4/17/19</a:t>
+              <a:t>4/18/19</a:t>
             </a:fld>
             <a:endParaRPr lang="en-US"/>
           </a:p>
@@ -5566,8 +5569,8 @@
         </p:nvSpPr>
         <p:spPr>
           <a:xfrm>
-            <a:off x="4337824" y="628234"/>
-            <a:ext cx="4047893" cy="5601533"/>
+            <a:off x="4337824" y="489734"/>
+            <a:ext cx="4047893" cy="5878532"/>
           </a:xfrm>
           <a:prstGeom prst="rect">
             <a:avLst/>
@@ -5745,6 +5748,16 @@
                 </a:solidFill>
               </a:rPr>
               <a:t>	Adding a new user</a:t>
+            </a:r>
+          </a:p>
+          <a:p>
+            <a:r>
+              <a:rPr lang="en-US" dirty="0">
+                <a:solidFill>
+                  <a:schemeClr val="bg1"/>
+                </a:solidFill>
+              </a:rPr>
+              <a:t>	Viewing all bookings</a:t>
             </a:r>
           </a:p>
           <a:p>
@@ -5803,8 +5816,8 @@
         </p:nvSpPr>
         <p:spPr>
           <a:xfrm>
-            <a:off x="2726473" y="400102"/>
-            <a:ext cx="3691054" cy="369332"/>
+            <a:off x="2726473" y="172884"/>
+            <a:ext cx="3691054" cy="646331"/>
           </a:xfrm>
           <a:prstGeom prst="rect">
             <a:avLst/>
@@ -5823,7 +5836,7 @@
                   <a:schemeClr val="bg1"/>
                 </a:solidFill>
               </a:rPr>
-              <a:t>This page displays your bookings.</a:t>
+              <a:t>This page displays your future bookings.</a:t>
             </a:r>
           </a:p>
         </p:txBody>
@@ -9415,7 +9428,7 @@
                   <a:schemeClr val="bg1"/>
                 </a:solidFill>
               </a:rPr>
-              <a:t>Viewing statistics</a:t>
+              <a:t>Viewing all bookings</a:t>
             </a:r>
           </a:p>
         </p:txBody>
@@ -9455,7 +9468,7 @@
           <p:cNvPr id="4" name="Picture 3">
             <a:extLst>
               <a:ext uri="{FF2B5EF4-FFF2-40B4-BE49-F238E27FC236}">
-                <a16:creationId xmlns:a16="http://schemas.microsoft.com/office/drawing/2014/main" id="{DA1009A1-62CB-E545-93B8-5C3DDBF59DDF}"/>
+                <a16:creationId xmlns:a16="http://schemas.microsoft.com/office/drawing/2014/main" id="{B7D90541-4F50-1840-9458-FA8963BEED8E}"/>
               </a:ext>
             </a:extLst>
           </p:cNvPr>
@@ -9485,7 +9498,7 @@
           <p:cNvPr id="5" name="TextBox 4">
             <a:extLst>
               <a:ext uri="{FF2B5EF4-FFF2-40B4-BE49-F238E27FC236}">
-                <a16:creationId xmlns:a16="http://schemas.microsoft.com/office/drawing/2014/main" id="{26EF07A2-94BA-F64B-AF79-CE6190149C4B}"/>
+                <a16:creationId xmlns:a16="http://schemas.microsoft.com/office/drawing/2014/main" id="{FE228A56-55A8-EE42-9677-6DD6F5004324}"/>
               </a:ext>
             </a:extLst>
           </p:cNvPr>
@@ -9494,7 +9507,7 @@
         </p:nvSpPr>
         <p:spPr>
           <a:xfrm>
-            <a:off x="4987556" y="4082362"/>
+            <a:off x="4987556" y="2204135"/>
             <a:ext cx="3691054" cy="646331"/>
           </a:xfrm>
           <a:prstGeom prst="rect">
@@ -9514,7 +9527,7 @@
                   <a:schemeClr val="bg1"/>
                 </a:solidFill>
               </a:rPr>
-              <a:t>From the administrator home screen, users should click ‘View Statistics’</a:t>
+              <a:t>From the administrator home screen, users should click ‘View bookings’</a:t>
             </a:r>
           </a:p>
         </p:txBody>
@@ -9524,7 +9537,7 @@
           <p:cNvPr id="6" name="Straight Arrow Connector 5">
             <a:extLst>
               <a:ext uri="{FF2B5EF4-FFF2-40B4-BE49-F238E27FC236}">
-                <a16:creationId xmlns:a16="http://schemas.microsoft.com/office/drawing/2014/main" id="{61855315-7D57-4943-AD6C-80D85D95EBBF}"/>
+                <a16:creationId xmlns:a16="http://schemas.microsoft.com/office/drawing/2014/main" id="{BE2B1468-FE1B-7747-AE05-366309A982C9}"/>
               </a:ext>
             </a:extLst>
           </p:cNvPr>
@@ -9536,8 +9549,8 @@
         </p:nvCxnSpPr>
         <p:spPr>
           <a:xfrm flipH="1" flipV="1">
-            <a:off x="3297836" y="4182256"/>
-            <a:ext cx="1689720" cy="223272"/>
+            <a:off x="3282846" y="1944265"/>
+            <a:ext cx="1704710" cy="583036"/>
           </a:xfrm>
           <a:prstGeom prst="straightConnector1">
             <a:avLst/>
@@ -9571,7 +9584,7 @@
           <p:cNvPr id="7" name="TextBox 6">
             <a:extLst>
               <a:ext uri="{FF2B5EF4-FFF2-40B4-BE49-F238E27FC236}">
-                <a16:creationId xmlns:a16="http://schemas.microsoft.com/office/drawing/2014/main" id="{327D540B-39D4-374C-A743-85C86C20C52A}"/>
+                <a16:creationId xmlns:a16="http://schemas.microsoft.com/office/drawing/2014/main" id="{A6F4895D-D2CF-B543-96A0-341E5E0DA616}"/>
               </a:ext>
             </a:extLst>
           </p:cNvPr>
@@ -9609,7 +9622,7 @@
     </p:spTree>
     <p:extLst>
       <p:ext uri="{BB962C8B-B14F-4D97-AF65-F5344CB8AC3E}">
-        <p14:creationId xmlns:p14="http://schemas.microsoft.com/office/powerpoint/2010/main" val="2830761211"/>
+        <p14:creationId xmlns:p14="http://schemas.microsoft.com/office/powerpoint/2010/main" val="730902301"/>
       </p:ext>
     </p:extLst>
   </p:cSld>
@@ -9636,62 +9649,42 @@
           <a:chExt cx="0" cy="0"/>
         </a:xfrm>
       </p:grpSpPr>
-      <p:sp>
-        <p:nvSpPr>
-          <p:cNvPr id="3" name="Content Placeholder 2">
-            <a:extLst>
-              <a:ext uri="{FF2B5EF4-FFF2-40B4-BE49-F238E27FC236}">
-                <a16:creationId xmlns:a16="http://schemas.microsoft.com/office/drawing/2014/main" id="{7A6D2A7D-6C72-AE4B-A17C-04ADA644749E}"/>
-              </a:ext>
-            </a:extLst>
-          </p:cNvPr>
-          <p:cNvSpPr>
-            <a:spLocks noGrp="1"/>
-          </p:cNvSpPr>
-          <p:nvPr>
-            <p:ph idx="1"/>
-          </p:nvPr>
-        </p:nvSpPr>
-        <p:spPr>
-          <a:xfrm>
-            <a:off x="628650" y="2939321"/>
-            <a:ext cx="7886700" cy="979359"/>
-          </a:xfrm>
-        </p:spPr>
-        <p:txBody>
-          <a:bodyPr/>
-          <a:lstStyle/>
-          <a:p>
-            <a:pPr marL="0" indent="0">
-              <a:buNone/>
-            </a:pPr>
-            <a:r>
-              <a:rPr lang="en-US" dirty="0">
-                <a:solidFill>
-                  <a:schemeClr val="bg1"/>
-                </a:solidFill>
-              </a:rPr>
-              <a:t>For all further enquiries or questions please contact the Engineering Department in the Queens Building.</a:t>
-            </a:r>
-          </a:p>
-          <a:p>
-            <a:pPr marL="0" indent="0">
-              <a:buNone/>
-            </a:pPr>
-            <a:endParaRPr lang="en-US" dirty="0">
-              <a:solidFill>
-                <a:schemeClr val="bg1"/>
-              </a:solidFill>
-            </a:endParaRPr>
-          </a:p>
-        </p:txBody>
-      </p:sp>
-      <p:sp>
-        <p:nvSpPr>
-          <p:cNvPr id="2" name="TextBox 1">
-            <a:extLst>
-              <a:ext uri="{FF2B5EF4-FFF2-40B4-BE49-F238E27FC236}">
-                <a16:creationId xmlns:a16="http://schemas.microsoft.com/office/drawing/2014/main" id="{B3007A08-F810-8743-A1FE-E2AB4F5A17D8}"/>
+      <p:pic>
+        <p:nvPicPr>
+          <p:cNvPr id="12" name="Picture 11">
+            <a:extLst>
+              <a:ext uri="{FF2B5EF4-FFF2-40B4-BE49-F238E27FC236}">
+                <a16:creationId xmlns:a16="http://schemas.microsoft.com/office/drawing/2014/main" id="{E0E5522B-91E0-5947-AD47-3AA09A7C8F4E}"/>
+              </a:ext>
+            </a:extLst>
+          </p:cNvPr>
+          <p:cNvPicPr>
+            <a:picLocks noChangeAspect="1"/>
+          </p:cNvPicPr>
+          <p:nvPr/>
+        </p:nvPicPr>
+        <p:blipFill>
+          <a:blip r:embed="rId2"/>
+          <a:stretch>
+            <a:fillRect/>
+          </a:stretch>
+        </p:blipFill>
+        <p:spPr>
+          <a:xfrm>
+            <a:off x="340152" y="1057688"/>
+            <a:ext cx="4523057" cy="4742623"/>
+          </a:xfrm>
+          <a:prstGeom prst="rect">
+            <a:avLst/>
+          </a:prstGeom>
+        </p:spPr>
+      </p:pic>
+      <p:sp>
+        <p:nvSpPr>
+          <p:cNvPr id="4" name="TextBox 3">
+            <a:extLst>
+              <a:ext uri="{FF2B5EF4-FFF2-40B4-BE49-F238E27FC236}">
+                <a16:creationId xmlns:a16="http://schemas.microsoft.com/office/drawing/2014/main" id="{676F0553-09FF-544A-BFC1-C2060108AD0D}"/>
               </a:ext>
             </a:extLst>
           </p:cNvPr>
@@ -9700,8 +9693,8 @@
         </p:nvSpPr>
         <p:spPr>
           <a:xfrm>
-            <a:off x="1929384" y="6596390"/>
-            <a:ext cx="5285232" cy="261610"/>
+            <a:off x="1929384" y="172884"/>
+            <a:ext cx="5285232" cy="646331"/>
           </a:xfrm>
           <a:prstGeom prst="rect">
             <a:avLst/>
@@ -9714,6 +9707,130 @@
           </a:bodyPr>
           <a:lstStyle/>
           <a:p>
+            <a:r>
+              <a:rPr lang="en-US" dirty="0">
+                <a:solidFill>
+                  <a:schemeClr val="bg1"/>
+                </a:solidFill>
+              </a:rPr>
+              <a:t>This page displays all users’ future bookings, along with which user made the booking</a:t>
+            </a:r>
+          </a:p>
+        </p:txBody>
+      </p:sp>
+      <p:sp>
+        <p:nvSpPr>
+          <p:cNvPr id="5" name="TextBox 4">
+            <a:extLst>
+              <a:ext uri="{FF2B5EF4-FFF2-40B4-BE49-F238E27FC236}">
+                <a16:creationId xmlns:a16="http://schemas.microsoft.com/office/drawing/2014/main" id="{350119A1-49B7-934D-A5C5-F2C92A593ED6}"/>
+              </a:ext>
+            </a:extLst>
+          </p:cNvPr>
+          <p:cNvSpPr txBox="1"/>
+          <p:nvPr/>
+        </p:nvSpPr>
+        <p:spPr>
+          <a:xfrm>
+            <a:off x="5335871" y="5552019"/>
+            <a:ext cx="3691054" cy="923330"/>
+          </a:xfrm>
+          <a:prstGeom prst="rect">
+            <a:avLst/>
+          </a:prstGeom>
+          <a:noFill/>
+        </p:spPr>
+        <p:txBody>
+          <a:bodyPr wrap="square" rtlCol="0">
+            <a:spAutoFit/>
+          </a:bodyPr>
+          <a:lstStyle/>
+          <a:p>
+            <a:r>
+              <a:rPr lang="en-US" dirty="0">
+                <a:solidFill>
+                  <a:schemeClr val="bg1"/>
+                </a:solidFill>
+              </a:rPr>
+              <a:t>Click here to see more information about a booking. The booking can be cancelled from here</a:t>
+            </a:r>
+          </a:p>
+        </p:txBody>
+      </p:sp>
+      <p:cxnSp>
+        <p:nvCxnSpPr>
+          <p:cNvPr id="9" name="Straight Arrow Connector 8">
+            <a:extLst>
+              <a:ext uri="{FF2B5EF4-FFF2-40B4-BE49-F238E27FC236}">
+                <a16:creationId xmlns:a16="http://schemas.microsoft.com/office/drawing/2014/main" id="{F85C5E52-E8C9-194A-AB70-953AF64CFE8E}"/>
+              </a:ext>
+            </a:extLst>
+          </p:cNvPr>
+          <p:cNvCxnSpPr>
+            <a:cxnSpLocks/>
+          </p:cNvCxnSpPr>
+          <p:nvPr/>
+        </p:nvCxnSpPr>
+        <p:spPr>
+          <a:xfrm flipH="1" flipV="1">
+            <a:off x="4689728" y="4852749"/>
+            <a:ext cx="646143" cy="699270"/>
+          </a:xfrm>
+          <a:prstGeom prst="straightConnector1">
+            <a:avLst/>
+          </a:prstGeom>
+          <a:ln w="31750">
+            <a:solidFill>
+              <a:schemeClr val="bg2">
+                <a:lumMod val="75000"/>
+              </a:schemeClr>
+            </a:solidFill>
+            <a:tailEnd type="triangle"/>
+          </a:ln>
+        </p:spPr>
+        <p:style>
+          <a:lnRef idx="1">
+            <a:schemeClr val="accent1"/>
+          </a:lnRef>
+          <a:fillRef idx="0">
+            <a:schemeClr val="accent1"/>
+          </a:fillRef>
+          <a:effectRef idx="0">
+            <a:schemeClr val="accent1"/>
+          </a:effectRef>
+          <a:fontRef idx="minor">
+            <a:schemeClr val="tx1"/>
+          </a:fontRef>
+        </p:style>
+      </p:cxnSp>
+      <p:sp>
+        <p:nvSpPr>
+          <p:cNvPr id="10" name="TextBox 9">
+            <a:extLst>
+              <a:ext uri="{FF2B5EF4-FFF2-40B4-BE49-F238E27FC236}">
+                <a16:creationId xmlns:a16="http://schemas.microsoft.com/office/drawing/2014/main" id="{9F14708A-7B9A-4D4C-BE80-988260242F7A}"/>
+              </a:ext>
+            </a:extLst>
+          </p:cNvPr>
+          <p:cNvSpPr txBox="1"/>
+          <p:nvPr/>
+        </p:nvSpPr>
+        <p:spPr>
+          <a:xfrm>
+            <a:off x="1929384" y="6596390"/>
+            <a:ext cx="5285232" cy="261610"/>
+          </a:xfrm>
+          <a:prstGeom prst="rect">
+            <a:avLst/>
+          </a:prstGeom>
+          <a:noFill/>
+        </p:spPr>
+        <p:txBody>
+          <a:bodyPr wrap="square" rtlCol="0">
+            <a:spAutoFit/>
+          </a:bodyPr>
+          <a:lstStyle/>
+          <a:p>
             <a:pPr algn="ctr"/>
             <a:r>
               <a:rPr lang="en-US" sz="1100" dirty="0">
@@ -9726,10 +9843,420 @@
           </a:p>
         </p:txBody>
       </p:sp>
+      <p:sp>
+        <p:nvSpPr>
+          <p:cNvPr id="14" name="TextBox 13">
+            <a:extLst>
+              <a:ext uri="{FF2B5EF4-FFF2-40B4-BE49-F238E27FC236}">
+                <a16:creationId xmlns:a16="http://schemas.microsoft.com/office/drawing/2014/main" id="{3E6D94A2-9657-344A-B0F8-491E1B78589D}"/>
+              </a:ext>
+            </a:extLst>
+          </p:cNvPr>
+          <p:cNvSpPr txBox="1"/>
+          <p:nvPr/>
+        </p:nvSpPr>
+        <p:spPr>
+          <a:xfrm>
+            <a:off x="5335871" y="2837242"/>
+            <a:ext cx="3691054" cy="923330"/>
+          </a:xfrm>
+          <a:prstGeom prst="rect">
+            <a:avLst/>
+          </a:prstGeom>
+          <a:noFill/>
+        </p:spPr>
+        <p:txBody>
+          <a:bodyPr wrap="square" rtlCol="0">
+            <a:spAutoFit/>
+          </a:bodyPr>
+          <a:lstStyle/>
+          <a:p>
+            <a:r>
+              <a:rPr lang="en-US" dirty="0">
+                <a:solidFill>
+                  <a:schemeClr val="bg1"/>
+                </a:solidFill>
+              </a:rPr>
+              <a:t>Click here to see more information about a the user that made the booking</a:t>
+            </a:r>
+          </a:p>
+        </p:txBody>
+      </p:sp>
+      <p:cxnSp>
+        <p:nvCxnSpPr>
+          <p:cNvPr id="15" name="Straight Arrow Connector 14">
+            <a:extLst>
+              <a:ext uri="{FF2B5EF4-FFF2-40B4-BE49-F238E27FC236}">
+                <a16:creationId xmlns:a16="http://schemas.microsoft.com/office/drawing/2014/main" id="{18230303-1442-1142-8FD1-C8DBD5D010D7}"/>
+              </a:ext>
+            </a:extLst>
+          </p:cNvPr>
+          <p:cNvCxnSpPr>
+            <a:cxnSpLocks/>
+          </p:cNvCxnSpPr>
+          <p:nvPr/>
+        </p:nvCxnSpPr>
+        <p:spPr>
+          <a:xfrm flipH="1" flipV="1">
+            <a:off x="4201297" y="2409568"/>
+            <a:ext cx="1134575" cy="719328"/>
+          </a:xfrm>
+          <a:prstGeom prst="straightConnector1">
+            <a:avLst/>
+          </a:prstGeom>
+          <a:ln w="31750">
+            <a:solidFill>
+              <a:schemeClr val="bg2">
+                <a:lumMod val="75000"/>
+              </a:schemeClr>
+            </a:solidFill>
+            <a:tailEnd type="triangle"/>
+          </a:ln>
+        </p:spPr>
+        <p:style>
+          <a:lnRef idx="1">
+            <a:schemeClr val="accent1"/>
+          </a:lnRef>
+          <a:fillRef idx="0">
+            <a:schemeClr val="accent1"/>
+          </a:fillRef>
+          <a:effectRef idx="0">
+            <a:schemeClr val="accent1"/>
+          </a:effectRef>
+          <a:fontRef idx="minor">
+            <a:schemeClr val="tx1"/>
+          </a:fontRef>
+        </p:style>
+      </p:cxnSp>
     </p:spTree>
     <p:extLst>
       <p:ext uri="{BB962C8B-B14F-4D97-AF65-F5344CB8AC3E}">
-        <p14:creationId xmlns:p14="http://schemas.microsoft.com/office/powerpoint/2010/main" val="3693994552"/>
+        <p14:creationId xmlns:p14="http://schemas.microsoft.com/office/powerpoint/2010/main" val="543447728"/>
+      </p:ext>
+    </p:extLst>
+  </p:cSld>
+  <p:clrMapOvr>
+    <a:masterClrMapping/>
+  </p:clrMapOvr>
+</p:sld>
+</file>
+
+<file path=ppt/slides/slide38.xml><?xml version="1.0" encoding="utf-8"?>
+<p:sld xmlns:a="http://schemas.openxmlformats.org/drawingml/2006/main" xmlns:r="http://schemas.openxmlformats.org/officeDocument/2006/relationships" xmlns:p="http://schemas.openxmlformats.org/presentationml/2006/main">
+  <p:cSld>
+    <p:spTree>
+      <p:nvGrpSpPr>
+        <p:cNvPr id="1" name=""/>
+        <p:cNvGrpSpPr/>
+        <p:nvPr/>
+      </p:nvGrpSpPr>
+      <p:grpSpPr>
+        <a:xfrm>
+          <a:off x="0" y="0"/>
+          <a:ext cx="0" cy="0"/>
+          <a:chOff x="0" y="0"/>
+          <a:chExt cx="0" cy="0"/>
+        </a:xfrm>
+      </p:grpSpPr>
+      <p:pic>
+        <p:nvPicPr>
+          <p:cNvPr id="4" name="Picture 3">
+            <a:extLst>
+              <a:ext uri="{FF2B5EF4-FFF2-40B4-BE49-F238E27FC236}">
+                <a16:creationId xmlns:a16="http://schemas.microsoft.com/office/drawing/2014/main" id="{D67AD576-A9DD-0E47-997E-0EFE94679D35}"/>
+              </a:ext>
+            </a:extLst>
+          </p:cNvPr>
+          <p:cNvPicPr>
+            <a:picLocks noChangeAspect="1"/>
+          </p:cNvPicPr>
+          <p:nvPr/>
+        </p:nvPicPr>
+        <p:blipFill rotWithShape="1">
+          <a:blip r:embed="rId2"/>
+          <a:srcRect r="71078"/>
+          <a:stretch/>
+        </p:blipFill>
+        <p:spPr>
+          <a:xfrm>
+            <a:off x="1174570" y="2551814"/>
+            <a:ext cx="1767582" cy="1754372"/>
+          </a:xfrm>
+          <a:prstGeom prst="rect">
+            <a:avLst/>
+          </a:prstGeom>
+        </p:spPr>
+      </p:pic>
+      <p:cxnSp>
+        <p:nvCxnSpPr>
+          <p:cNvPr id="5" name="Straight Connector 4">
+            <a:extLst>
+              <a:ext uri="{FF2B5EF4-FFF2-40B4-BE49-F238E27FC236}">
+                <a16:creationId xmlns:a16="http://schemas.microsoft.com/office/drawing/2014/main" id="{7C04D326-BD45-B84A-A5C8-995C90493152}"/>
+              </a:ext>
+            </a:extLst>
+          </p:cNvPr>
+          <p:cNvCxnSpPr/>
+          <p:nvPr/>
+        </p:nvCxnSpPr>
+        <p:spPr>
+          <a:xfrm>
+            <a:off x="3680422" y="1685261"/>
+            <a:ext cx="0" cy="3487479"/>
+          </a:xfrm>
+          <a:prstGeom prst="line">
+            <a:avLst/>
+          </a:prstGeom>
+          <a:ln w="38100">
+            <a:solidFill>
+              <a:schemeClr val="bg1"/>
+            </a:solidFill>
+          </a:ln>
+        </p:spPr>
+        <p:style>
+          <a:lnRef idx="1">
+            <a:schemeClr val="accent1"/>
+          </a:lnRef>
+          <a:fillRef idx="0">
+            <a:schemeClr val="accent1"/>
+          </a:fillRef>
+          <a:effectRef idx="0">
+            <a:schemeClr val="accent1"/>
+          </a:effectRef>
+          <a:fontRef idx="minor">
+            <a:schemeClr val="tx1"/>
+          </a:fontRef>
+        </p:style>
+      </p:cxnSp>
+      <p:sp>
+        <p:nvSpPr>
+          <p:cNvPr id="6" name="TextBox 5">
+            <a:extLst>
+              <a:ext uri="{FF2B5EF4-FFF2-40B4-BE49-F238E27FC236}">
+                <a16:creationId xmlns:a16="http://schemas.microsoft.com/office/drawing/2014/main" id="{E1B47DCB-040C-5F47-8C39-03F30B748B79}"/>
+              </a:ext>
+            </a:extLst>
+          </p:cNvPr>
+          <p:cNvSpPr txBox="1"/>
+          <p:nvPr/>
+        </p:nvSpPr>
+        <p:spPr>
+          <a:xfrm>
+            <a:off x="4337824" y="3136613"/>
+            <a:ext cx="4047893" cy="584775"/>
+          </a:xfrm>
+          <a:prstGeom prst="rect">
+            <a:avLst/>
+          </a:prstGeom>
+          <a:noFill/>
+        </p:spPr>
+        <p:txBody>
+          <a:bodyPr wrap="square" rtlCol="0">
+            <a:spAutoFit/>
+          </a:bodyPr>
+          <a:lstStyle/>
+          <a:p>
+            <a:r>
+              <a:rPr lang="en-US" sz="3200" dirty="0">
+                <a:solidFill>
+                  <a:schemeClr val="bg1"/>
+                </a:solidFill>
+              </a:rPr>
+              <a:t>Viewing statistics</a:t>
+            </a:r>
+          </a:p>
+        </p:txBody>
+      </p:sp>
+    </p:spTree>
+    <p:extLst>
+      <p:ext uri="{BB962C8B-B14F-4D97-AF65-F5344CB8AC3E}">
+        <p14:creationId xmlns:p14="http://schemas.microsoft.com/office/powerpoint/2010/main" val="1976239557"/>
+      </p:ext>
+    </p:extLst>
+  </p:cSld>
+  <p:clrMapOvr>
+    <a:masterClrMapping/>
+  </p:clrMapOvr>
+</p:sld>
+</file>
+
+<file path=ppt/slides/slide39.xml><?xml version="1.0" encoding="utf-8"?>
+<p:sld xmlns:a="http://schemas.openxmlformats.org/drawingml/2006/main" xmlns:r="http://schemas.openxmlformats.org/officeDocument/2006/relationships" xmlns:p="http://schemas.openxmlformats.org/presentationml/2006/main">
+  <p:cSld>
+    <p:spTree>
+      <p:nvGrpSpPr>
+        <p:cNvPr id="1" name=""/>
+        <p:cNvGrpSpPr/>
+        <p:nvPr/>
+      </p:nvGrpSpPr>
+      <p:grpSpPr>
+        <a:xfrm>
+          <a:off x="0" y="0"/>
+          <a:ext cx="0" cy="0"/>
+          <a:chOff x="0" y="0"/>
+          <a:chExt cx="0" cy="0"/>
+        </a:xfrm>
+      </p:grpSpPr>
+      <p:pic>
+        <p:nvPicPr>
+          <p:cNvPr id="4" name="Picture 3">
+            <a:extLst>
+              <a:ext uri="{FF2B5EF4-FFF2-40B4-BE49-F238E27FC236}">
+                <a16:creationId xmlns:a16="http://schemas.microsoft.com/office/drawing/2014/main" id="{DA1009A1-62CB-E545-93B8-5C3DDBF59DDF}"/>
+              </a:ext>
+            </a:extLst>
+          </p:cNvPr>
+          <p:cNvPicPr>
+            <a:picLocks noChangeAspect="1"/>
+          </p:cNvPicPr>
+          <p:nvPr/>
+        </p:nvPicPr>
+        <p:blipFill>
+          <a:blip r:embed="rId2"/>
+          <a:stretch>
+            <a:fillRect/>
+          </a:stretch>
+        </p:blipFill>
+        <p:spPr>
+          <a:xfrm>
+            <a:off x="465390" y="737501"/>
+            <a:ext cx="3012258" cy="5339913"/>
+          </a:xfrm>
+          <a:prstGeom prst="rect">
+            <a:avLst/>
+          </a:prstGeom>
+        </p:spPr>
+      </p:pic>
+      <p:sp>
+        <p:nvSpPr>
+          <p:cNvPr id="5" name="TextBox 4">
+            <a:extLst>
+              <a:ext uri="{FF2B5EF4-FFF2-40B4-BE49-F238E27FC236}">
+                <a16:creationId xmlns:a16="http://schemas.microsoft.com/office/drawing/2014/main" id="{26EF07A2-94BA-F64B-AF79-CE6190149C4B}"/>
+              </a:ext>
+            </a:extLst>
+          </p:cNvPr>
+          <p:cNvSpPr txBox="1"/>
+          <p:nvPr/>
+        </p:nvSpPr>
+        <p:spPr>
+          <a:xfrm>
+            <a:off x="4987556" y="4082362"/>
+            <a:ext cx="3691054" cy="646331"/>
+          </a:xfrm>
+          <a:prstGeom prst="rect">
+            <a:avLst/>
+          </a:prstGeom>
+          <a:noFill/>
+        </p:spPr>
+        <p:txBody>
+          <a:bodyPr wrap="square" rtlCol="0">
+            <a:spAutoFit/>
+          </a:bodyPr>
+          <a:lstStyle/>
+          <a:p>
+            <a:r>
+              <a:rPr lang="en-US" dirty="0">
+                <a:solidFill>
+                  <a:schemeClr val="bg1"/>
+                </a:solidFill>
+              </a:rPr>
+              <a:t>From the administrator home screen, users should click ‘View Statistics’</a:t>
+            </a:r>
+          </a:p>
+        </p:txBody>
+      </p:sp>
+      <p:cxnSp>
+        <p:nvCxnSpPr>
+          <p:cNvPr id="6" name="Straight Arrow Connector 5">
+            <a:extLst>
+              <a:ext uri="{FF2B5EF4-FFF2-40B4-BE49-F238E27FC236}">
+                <a16:creationId xmlns:a16="http://schemas.microsoft.com/office/drawing/2014/main" id="{61855315-7D57-4943-AD6C-80D85D95EBBF}"/>
+              </a:ext>
+            </a:extLst>
+          </p:cNvPr>
+          <p:cNvCxnSpPr>
+            <a:cxnSpLocks/>
+            <a:stCxn id="5" idx="1"/>
+          </p:cNvCxnSpPr>
+          <p:nvPr/>
+        </p:nvCxnSpPr>
+        <p:spPr>
+          <a:xfrm flipH="1" flipV="1">
+            <a:off x="3297836" y="4182256"/>
+            <a:ext cx="1689720" cy="223272"/>
+          </a:xfrm>
+          <a:prstGeom prst="straightConnector1">
+            <a:avLst/>
+          </a:prstGeom>
+          <a:ln w="31750">
+            <a:solidFill>
+              <a:schemeClr val="bg2">
+                <a:lumMod val="75000"/>
+              </a:schemeClr>
+            </a:solidFill>
+            <a:tailEnd type="triangle"/>
+          </a:ln>
+        </p:spPr>
+        <p:style>
+          <a:lnRef idx="1">
+            <a:schemeClr val="accent1"/>
+          </a:lnRef>
+          <a:fillRef idx="0">
+            <a:schemeClr val="accent1"/>
+          </a:fillRef>
+          <a:effectRef idx="0">
+            <a:schemeClr val="accent1"/>
+          </a:effectRef>
+          <a:fontRef idx="minor">
+            <a:schemeClr val="tx1"/>
+          </a:fontRef>
+        </p:style>
+      </p:cxnSp>
+      <p:sp>
+        <p:nvSpPr>
+          <p:cNvPr id="7" name="TextBox 6">
+            <a:extLst>
+              <a:ext uri="{FF2B5EF4-FFF2-40B4-BE49-F238E27FC236}">
+                <a16:creationId xmlns:a16="http://schemas.microsoft.com/office/drawing/2014/main" id="{327D540B-39D4-374C-A743-85C86C20C52A}"/>
+              </a:ext>
+            </a:extLst>
+          </p:cNvPr>
+          <p:cNvSpPr txBox="1"/>
+          <p:nvPr/>
+        </p:nvSpPr>
+        <p:spPr>
+          <a:xfrm>
+            <a:off x="1929384" y="6596390"/>
+            <a:ext cx="5285232" cy="261610"/>
+          </a:xfrm>
+          <a:prstGeom prst="rect">
+            <a:avLst/>
+          </a:prstGeom>
+          <a:noFill/>
+        </p:spPr>
+        <p:txBody>
+          <a:bodyPr wrap="square" rtlCol="0">
+            <a:spAutoFit/>
+          </a:bodyPr>
+          <a:lstStyle/>
+          <a:p>
+            <a:pPr algn="ctr"/>
+            <a:r>
+              <a:rPr lang="en-US" sz="1100" dirty="0">
+                <a:solidFill>
+                  <a:schemeClr val="bg1"/>
+                </a:solidFill>
+              </a:rPr>
+              <a:t>University of Bristol Study Space Booking App - SPE</a:t>
+            </a:r>
+          </a:p>
+        </p:txBody>
+      </p:sp>
+    </p:spTree>
+    <p:extLst>
+      <p:ext uri="{BB962C8B-B14F-4D97-AF65-F5344CB8AC3E}">
+        <p14:creationId xmlns:p14="http://schemas.microsoft.com/office/powerpoint/2010/main" val="2830761211"/>
       </p:ext>
     </p:extLst>
   </p:cSld>
@@ -9916,6 +10443,126 @@
     <p:extLst>
       <p:ext uri="{BB962C8B-B14F-4D97-AF65-F5344CB8AC3E}">
         <p14:creationId xmlns:p14="http://schemas.microsoft.com/office/powerpoint/2010/main" val="1785143551"/>
+      </p:ext>
+    </p:extLst>
+  </p:cSld>
+  <p:clrMapOvr>
+    <a:masterClrMapping/>
+  </p:clrMapOvr>
+</p:sld>
+</file>
+
+<file path=ppt/slides/slide40.xml><?xml version="1.0" encoding="utf-8"?>
+<p:sld xmlns:a="http://schemas.openxmlformats.org/drawingml/2006/main" xmlns:r="http://schemas.openxmlformats.org/officeDocument/2006/relationships" xmlns:p="http://schemas.openxmlformats.org/presentationml/2006/main">
+  <p:cSld>
+    <p:spTree>
+      <p:nvGrpSpPr>
+        <p:cNvPr id="1" name=""/>
+        <p:cNvGrpSpPr/>
+        <p:nvPr/>
+      </p:nvGrpSpPr>
+      <p:grpSpPr>
+        <a:xfrm>
+          <a:off x="0" y="0"/>
+          <a:ext cx="0" cy="0"/>
+          <a:chOff x="0" y="0"/>
+          <a:chExt cx="0" cy="0"/>
+        </a:xfrm>
+      </p:grpSpPr>
+      <p:sp>
+        <p:nvSpPr>
+          <p:cNvPr id="3" name="Content Placeholder 2">
+            <a:extLst>
+              <a:ext uri="{FF2B5EF4-FFF2-40B4-BE49-F238E27FC236}">
+                <a16:creationId xmlns:a16="http://schemas.microsoft.com/office/drawing/2014/main" id="{7A6D2A7D-6C72-AE4B-A17C-04ADA644749E}"/>
+              </a:ext>
+            </a:extLst>
+          </p:cNvPr>
+          <p:cNvSpPr>
+            <a:spLocks noGrp="1"/>
+          </p:cNvSpPr>
+          <p:nvPr>
+            <p:ph idx="1"/>
+          </p:nvPr>
+        </p:nvSpPr>
+        <p:spPr>
+          <a:xfrm>
+            <a:off x="628650" y="2939321"/>
+            <a:ext cx="7886700" cy="979359"/>
+          </a:xfrm>
+        </p:spPr>
+        <p:txBody>
+          <a:bodyPr/>
+          <a:lstStyle/>
+          <a:p>
+            <a:pPr marL="0" indent="0">
+              <a:buNone/>
+            </a:pPr>
+            <a:r>
+              <a:rPr lang="en-US" dirty="0">
+                <a:solidFill>
+                  <a:schemeClr val="bg1"/>
+                </a:solidFill>
+              </a:rPr>
+              <a:t>For all further enquiries or questions please contact the Engineering Department in the Queens Building.</a:t>
+            </a:r>
+          </a:p>
+          <a:p>
+            <a:pPr marL="0" indent="0">
+              <a:buNone/>
+            </a:pPr>
+            <a:endParaRPr lang="en-US" dirty="0">
+              <a:solidFill>
+                <a:schemeClr val="bg1"/>
+              </a:solidFill>
+            </a:endParaRPr>
+          </a:p>
+        </p:txBody>
+      </p:sp>
+      <p:sp>
+        <p:nvSpPr>
+          <p:cNvPr id="2" name="TextBox 1">
+            <a:extLst>
+              <a:ext uri="{FF2B5EF4-FFF2-40B4-BE49-F238E27FC236}">
+                <a16:creationId xmlns:a16="http://schemas.microsoft.com/office/drawing/2014/main" id="{B3007A08-F810-8743-A1FE-E2AB4F5A17D8}"/>
+              </a:ext>
+            </a:extLst>
+          </p:cNvPr>
+          <p:cNvSpPr txBox="1"/>
+          <p:nvPr/>
+        </p:nvSpPr>
+        <p:spPr>
+          <a:xfrm>
+            <a:off x="1929384" y="6596390"/>
+            <a:ext cx="5285232" cy="261610"/>
+          </a:xfrm>
+          <a:prstGeom prst="rect">
+            <a:avLst/>
+          </a:prstGeom>
+          <a:noFill/>
+        </p:spPr>
+        <p:txBody>
+          <a:bodyPr wrap="square" rtlCol="0">
+            <a:spAutoFit/>
+          </a:bodyPr>
+          <a:lstStyle/>
+          <a:p>
+            <a:pPr algn="ctr"/>
+            <a:r>
+              <a:rPr lang="en-US" sz="1100" dirty="0">
+                <a:solidFill>
+                  <a:schemeClr val="bg1"/>
+                </a:solidFill>
+              </a:rPr>
+              <a:t>University of Bristol Study Space Booking App - SPE</a:t>
+            </a:r>
+          </a:p>
+        </p:txBody>
+      </p:sp>
+    </p:spTree>
+    <p:extLst>
+      <p:ext uri="{BB962C8B-B14F-4D97-AF65-F5344CB8AC3E}">
+        <p14:creationId xmlns:p14="http://schemas.microsoft.com/office/powerpoint/2010/main" val="3693994552"/>
       </p:ext>
     </p:extLst>
   </p:cSld>

</xml_diff>